<commit_message>
relabelled nmds treatments, removed patch labels, saved to ppt
</commit_message>
<xml_diff>
--- a/output/figures/NMDS.end.pptx
+++ b/output/figures/NMDS.end.pptx
@@ -3287,1197 +3287,7 @@
         </p:sp>
         <p:sp>
           <p:nvSpPr>
-            <p:cNvPr id="33" name="pl33"/>
-            <p:cNvSpPr/>
-            <p:nvPr/>
-          </p:nvSpPr>
-          <p:spPr>
-            <a:xfrm>
-              <a:off x="1821825" y="3100672"/>
-              <a:ext cx="159711" cy="61738"/>
-            </a:xfrm>
-            <a:custGeom>
-              <a:avLst/>
-              <a:pathLst>
-                <a:path w="159711" h="61738">
-                  <a:moveTo>
-                    <a:pt x="159711" y="61738"/>
-                  </a:moveTo>
-                  <a:lnTo>
-                    <a:pt x="0" y="0"/>
-                  </a:lnTo>
-                </a:path>
-              </a:pathLst>
-            </a:custGeom>
-            <a:ln w="13550" cap="rnd">
-              <a:solidFill>
-                <a:srgbClr val="00BF7D">
-                  <a:alpha val="100000"/>
-                </a:srgbClr>
-              </a:solidFill>
-              <a:prstDash val="solid"/>
-              <a:round/>
-            </a:ln>
-          </p:spPr>
-          <p:txBody>
-            <a:bodyPr/>
-            <a:lstStyle/>
-            <a:p/>
-          </p:txBody>
-        </p:sp>
-        <p:sp>
-          <p:nvSpPr>
-            <p:cNvPr id="34" name="tx34"/>
-            <p:cNvSpPr/>
-            <p:nvPr/>
-          </p:nvSpPr>
-          <p:spPr>
-            <a:xfrm>
-              <a:off x="3504036" y="2631178"/>
-              <a:ext cx="272740" cy="100771"/>
-            </a:xfrm>
-            <a:prstGeom prst="rect">
-              <a:avLst/>
-            </a:prstGeom>
-            <a:noFill/>
-          </p:spPr>
-          <p:txBody>
-            <a:bodyPr lIns="0" rIns="0" tIns="0" bIns="0" anchorCtr="1" anchor="ctr" wrap="none"/>
-            <a:lstStyle/>
-            <a:p>
-              <a:pPr algn="l" marL="0" marR="0" indent="0">
-                <a:lnSpc>
-                  <a:spcPts val="1103"/>
-                </a:lnSpc>
-                <a:spcBef>
-                  <a:spcPts val="0"/>
-                </a:spcBef>
-                <a:spcAft>
-                  <a:spcPts val="0"/>
-                </a:spcAft>
-              </a:pPr>
-              <a:r>
-                <a:rPr sz="1103">
-                  <a:solidFill>
-                    <a:srgbClr val="F8766D">
-                      <a:alpha val="100000"/>
-                    </a:srgbClr>
-                  </a:solidFill>
-                  <a:latin typeface="Arial"/>
-                  <a:cs typeface="Arial"/>
-                </a:rPr>
-                <a:t>BH1</a:t>
-              </a:r>
-            </a:p>
-          </p:txBody>
-        </p:sp>
-        <p:sp>
-          <p:nvSpPr>
-            <p:cNvPr id="35" name="tx35"/>
-            <p:cNvSpPr/>
-            <p:nvPr/>
-          </p:nvSpPr>
-          <p:spPr>
-            <a:xfrm>
-              <a:off x="4313067" y="3527513"/>
-              <a:ext cx="272740" cy="100771"/>
-            </a:xfrm>
-            <a:prstGeom prst="rect">
-              <a:avLst/>
-            </a:prstGeom>
-            <a:noFill/>
-          </p:spPr>
-          <p:txBody>
-            <a:bodyPr lIns="0" rIns="0" tIns="0" bIns="0" anchorCtr="1" anchor="ctr" wrap="none"/>
-            <a:lstStyle/>
-            <a:p>
-              <a:pPr algn="l" marL="0" marR="0" indent="0">
-                <a:lnSpc>
-                  <a:spcPts val="1103"/>
-                </a:lnSpc>
-                <a:spcBef>
-                  <a:spcPts val="0"/>
-                </a:spcBef>
-                <a:spcAft>
-                  <a:spcPts val="0"/>
-                </a:spcAft>
-              </a:pPr>
-              <a:r>
-                <a:rPr sz="1103">
-                  <a:solidFill>
-                    <a:srgbClr val="F8766D">
-                      <a:alpha val="100000"/>
-                    </a:srgbClr>
-                  </a:solidFill>
-                  <a:latin typeface="Arial"/>
-                  <a:cs typeface="Arial"/>
-                </a:rPr>
-                <a:t>BH2</a:t>
-              </a:r>
-            </a:p>
-          </p:txBody>
-        </p:sp>
-        <p:sp>
-          <p:nvSpPr>
-            <p:cNvPr id="36" name="tx36"/>
-            <p:cNvSpPr/>
-            <p:nvPr/>
-          </p:nvSpPr>
-          <p:spPr>
-            <a:xfrm>
-              <a:off x="3120544" y="3519390"/>
-              <a:ext cx="272740" cy="102551"/>
-            </a:xfrm>
-            <a:prstGeom prst="rect">
-              <a:avLst/>
-            </a:prstGeom>
-            <a:noFill/>
-          </p:spPr>
-          <p:txBody>
-            <a:bodyPr lIns="0" rIns="0" tIns="0" bIns="0" anchorCtr="1" anchor="ctr" wrap="none"/>
-            <a:lstStyle/>
-            <a:p>
-              <a:pPr algn="l" marL="0" marR="0" indent="0">
-                <a:lnSpc>
-                  <a:spcPts val="1103"/>
-                </a:lnSpc>
-                <a:spcBef>
-                  <a:spcPts val="0"/>
-                </a:spcBef>
-                <a:spcAft>
-                  <a:spcPts val="0"/>
-                </a:spcAft>
-              </a:pPr>
-              <a:r>
-                <a:rPr sz="1103">
-                  <a:solidFill>
-                    <a:srgbClr val="F8766D">
-                      <a:alpha val="100000"/>
-                    </a:srgbClr>
-                  </a:solidFill>
-                  <a:latin typeface="Arial"/>
-                  <a:cs typeface="Arial"/>
-                </a:rPr>
-                <a:t>BH3</a:t>
-              </a:r>
-            </a:p>
-          </p:txBody>
-        </p:sp>
-        <p:sp>
-          <p:nvSpPr>
-            <p:cNvPr id="37" name="tx37"/>
-            <p:cNvSpPr/>
-            <p:nvPr/>
-          </p:nvSpPr>
-          <p:spPr>
-            <a:xfrm>
-              <a:off x="4719987" y="2961526"/>
-              <a:ext cx="272740" cy="100360"/>
-            </a:xfrm>
-            <a:prstGeom prst="rect">
-              <a:avLst/>
-            </a:prstGeom>
-            <a:noFill/>
-          </p:spPr>
-          <p:txBody>
-            <a:bodyPr lIns="0" rIns="0" tIns="0" bIns="0" anchorCtr="1" anchor="ctr" wrap="none"/>
-            <a:lstStyle/>
-            <a:p>
-              <a:pPr algn="l" marL="0" marR="0" indent="0">
-                <a:lnSpc>
-                  <a:spcPts val="1103"/>
-                </a:lnSpc>
-                <a:spcBef>
-                  <a:spcPts val="0"/>
-                </a:spcBef>
-                <a:spcAft>
-                  <a:spcPts val="0"/>
-                </a:spcAft>
-              </a:pPr>
-              <a:r>
-                <a:rPr sz="1103">
-                  <a:solidFill>
-                    <a:srgbClr val="F8766D">
-                      <a:alpha val="100000"/>
-                    </a:srgbClr>
-                  </a:solidFill>
-                  <a:latin typeface="Arial"/>
-                  <a:cs typeface="Arial"/>
-                </a:rPr>
-                <a:t>BH4</a:t>
-              </a:r>
-            </a:p>
-          </p:txBody>
-        </p:sp>
-        <p:sp>
-          <p:nvSpPr>
-            <p:cNvPr id="38" name="tx38"/>
-            <p:cNvSpPr/>
-            <p:nvPr/>
-          </p:nvSpPr>
-          <p:spPr>
-            <a:xfrm>
-              <a:off x="3503838" y="1729570"/>
-              <a:ext cx="272740" cy="102072"/>
-            </a:xfrm>
-            <a:prstGeom prst="rect">
-              <a:avLst/>
-            </a:prstGeom>
-            <a:noFill/>
-          </p:spPr>
-          <p:txBody>
-            <a:bodyPr lIns="0" rIns="0" tIns="0" bIns="0" anchorCtr="1" anchor="ctr" wrap="none"/>
-            <a:lstStyle/>
-            <a:p>
-              <a:pPr algn="l" marL="0" marR="0" indent="0">
-                <a:lnSpc>
-                  <a:spcPts val="1103"/>
-                </a:lnSpc>
-                <a:spcBef>
-                  <a:spcPts val="0"/>
-                </a:spcBef>
-                <a:spcAft>
-                  <a:spcPts val="0"/>
-                </a:spcAft>
-              </a:pPr>
-              <a:r>
-                <a:rPr sz="1103">
-                  <a:solidFill>
-                    <a:srgbClr val="F8766D">
-                      <a:alpha val="100000"/>
-                    </a:srgbClr>
-                  </a:solidFill>
-                  <a:latin typeface="Arial"/>
-                  <a:cs typeface="Arial"/>
-                </a:rPr>
-                <a:t>BH5</a:t>
-              </a:r>
-            </a:p>
-          </p:txBody>
-        </p:sp>
-        <p:sp>
-          <p:nvSpPr>
-            <p:cNvPr id="39" name="tx39"/>
-            <p:cNvSpPr/>
-            <p:nvPr/>
-          </p:nvSpPr>
-          <p:spPr>
-            <a:xfrm>
-              <a:off x="1630928" y="3141282"/>
-              <a:ext cx="280544" cy="109944"/>
-            </a:xfrm>
-            <a:prstGeom prst="rect">
-              <a:avLst/>
-            </a:prstGeom>
-            <a:noFill/>
-          </p:spPr>
-          <p:txBody>
-            <a:bodyPr lIns="0" rIns="0" tIns="0" bIns="0" anchorCtr="1" anchor="ctr" wrap="none"/>
-            <a:lstStyle/>
-            <a:p>
-              <a:pPr algn="l" marL="0" marR="0" indent="0">
-                <a:lnSpc>
-                  <a:spcPts val="1103"/>
-                </a:lnSpc>
-                <a:spcBef>
-                  <a:spcPts val="0"/>
-                </a:spcBef>
-                <a:spcAft>
-                  <a:spcPts val="0"/>
-                </a:spcAft>
-              </a:pPr>
-              <a:r>
-                <a:rPr sz="1103">
-                  <a:solidFill>
-                    <a:srgbClr val="A3A500">
-                      <a:alpha val="100000"/>
-                    </a:srgbClr>
-                  </a:solidFill>
-                  <a:latin typeface="Arial"/>
-                  <a:cs typeface="Arial"/>
-                </a:rPr>
-                <a:t>BQ1</a:t>
-              </a:r>
-            </a:p>
-          </p:txBody>
-        </p:sp>
-        <p:sp>
-          <p:nvSpPr>
-            <p:cNvPr id="40" name="tx40"/>
-            <p:cNvSpPr/>
-            <p:nvPr/>
-          </p:nvSpPr>
-          <p:spPr>
-            <a:xfrm>
-              <a:off x="4094795" y="3890301"/>
-              <a:ext cx="280544" cy="109944"/>
-            </a:xfrm>
-            <a:prstGeom prst="rect">
-              <a:avLst/>
-            </a:prstGeom>
-            <a:noFill/>
-          </p:spPr>
-          <p:txBody>
-            <a:bodyPr lIns="0" rIns="0" tIns="0" bIns="0" anchorCtr="1" anchor="ctr" wrap="none"/>
-            <a:lstStyle/>
-            <a:p>
-              <a:pPr algn="l" marL="0" marR="0" indent="0">
-                <a:lnSpc>
-                  <a:spcPts val="1103"/>
-                </a:lnSpc>
-                <a:spcBef>
-                  <a:spcPts val="0"/>
-                </a:spcBef>
-                <a:spcAft>
-                  <a:spcPts val="0"/>
-                </a:spcAft>
-              </a:pPr>
-              <a:r>
-                <a:rPr sz="1103">
-                  <a:solidFill>
-                    <a:srgbClr val="A3A500">
-                      <a:alpha val="100000"/>
-                    </a:srgbClr>
-                  </a:solidFill>
-                  <a:latin typeface="Arial"/>
-                  <a:cs typeface="Arial"/>
-                </a:rPr>
-                <a:t>BQ2</a:t>
-              </a:r>
-            </a:p>
-          </p:txBody>
-        </p:sp>
-        <p:sp>
-          <p:nvSpPr>
-            <p:cNvPr id="41" name="tx41"/>
-            <p:cNvSpPr/>
-            <p:nvPr/>
-          </p:nvSpPr>
-          <p:spPr>
-            <a:xfrm>
-              <a:off x="2914291" y="2522765"/>
-              <a:ext cx="280544" cy="109944"/>
-            </a:xfrm>
-            <a:prstGeom prst="rect">
-              <a:avLst/>
-            </a:prstGeom>
-            <a:noFill/>
-          </p:spPr>
-          <p:txBody>
-            <a:bodyPr lIns="0" rIns="0" tIns="0" bIns="0" anchorCtr="1" anchor="ctr" wrap="none"/>
-            <a:lstStyle/>
-            <a:p>
-              <a:pPr algn="l" marL="0" marR="0" indent="0">
-                <a:lnSpc>
-                  <a:spcPts val="1103"/>
-                </a:lnSpc>
-                <a:spcBef>
-                  <a:spcPts val="0"/>
-                </a:spcBef>
-                <a:spcAft>
-                  <a:spcPts val="0"/>
-                </a:spcAft>
-              </a:pPr>
-              <a:r>
-                <a:rPr sz="1103">
-                  <a:solidFill>
-                    <a:srgbClr val="A3A500">
-                      <a:alpha val="100000"/>
-                    </a:srgbClr>
-                  </a:solidFill>
-                  <a:latin typeface="Arial"/>
-                  <a:cs typeface="Arial"/>
-                </a:rPr>
-                <a:t>BQ3</a:t>
-              </a:r>
-            </a:p>
-          </p:txBody>
-        </p:sp>
-        <p:sp>
-          <p:nvSpPr>
-            <p:cNvPr id="42" name="tx42"/>
-            <p:cNvSpPr/>
-            <p:nvPr/>
-          </p:nvSpPr>
-          <p:spPr>
-            <a:xfrm>
-              <a:off x="1656806" y="2927503"/>
-              <a:ext cx="280544" cy="109944"/>
-            </a:xfrm>
-            <a:prstGeom prst="rect">
-              <a:avLst/>
-            </a:prstGeom>
-            <a:noFill/>
-          </p:spPr>
-          <p:txBody>
-            <a:bodyPr lIns="0" rIns="0" tIns="0" bIns="0" anchorCtr="1" anchor="ctr" wrap="none"/>
-            <a:lstStyle/>
-            <a:p>
-              <a:pPr algn="l" marL="0" marR="0" indent="0">
-                <a:lnSpc>
-                  <a:spcPts val="1103"/>
-                </a:lnSpc>
-                <a:spcBef>
-                  <a:spcPts val="0"/>
-                </a:spcBef>
-                <a:spcAft>
-                  <a:spcPts val="0"/>
-                </a:spcAft>
-              </a:pPr>
-              <a:r>
-                <a:rPr sz="1103">
-                  <a:solidFill>
-                    <a:srgbClr val="A3A500">
-                      <a:alpha val="100000"/>
-                    </a:srgbClr>
-                  </a:solidFill>
-                  <a:latin typeface="Arial"/>
-                  <a:cs typeface="Arial"/>
-                </a:rPr>
-                <a:t>BQ4</a:t>
-              </a:r>
-            </a:p>
-          </p:txBody>
-        </p:sp>
-        <p:sp>
-          <p:nvSpPr>
-            <p:cNvPr id="43" name="tx43"/>
-            <p:cNvSpPr/>
-            <p:nvPr/>
-          </p:nvSpPr>
-          <p:spPr>
-            <a:xfrm>
-              <a:off x="3260088" y="1413930"/>
-              <a:ext cx="280544" cy="109944"/>
-            </a:xfrm>
-            <a:prstGeom prst="rect">
-              <a:avLst/>
-            </a:prstGeom>
-            <a:noFill/>
-          </p:spPr>
-          <p:txBody>
-            <a:bodyPr lIns="0" rIns="0" tIns="0" bIns="0" anchorCtr="1" anchor="ctr" wrap="none"/>
-            <a:lstStyle/>
-            <a:p>
-              <a:pPr algn="l" marL="0" marR="0" indent="0">
-                <a:lnSpc>
-                  <a:spcPts val="1103"/>
-                </a:lnSpc>
-                <a:spcBef>
-                  <a:spcPts val="0"/>
-                </a:spcBef>
-                <a:spcAft>
-                  <a:spcPts val="0"/>
-                </a:spcAft>
-              </a:pPr>
-              <a:r>
-                <a:rPr sz="1103">
-                  <a:solidFill>
-                    <a:srgbClr val="A3A500">
-                      <a:alpha val="100000"/>
-                    </a:srgbClr>
-                  </a:solidFill>
-                  <a:latin typeface="Arial"/>
-                  <a:cs typeface="Arial"/>
-                </a:rPr>
-                <a:t>BQ5</a:t>
-              </a:r>
-            </a:p>
-          </p:txBody>
-        </p:sp>
-        <p:sp>
-          <p:nvSpPr>
-            <p:cNvPr id="44" name="tx44"/>
-            <p:cNvSpPr/>
-            <p:nvPr/>
-          </p:nvSpPr>
-          <p:spPr>
-            <a:xfrm>
-              <a:off x="2815581" y="3269863"/>
-              <a:ext cx="257200" cy="100771"/>
-            </a:xfrm>
-            <a:prstGeom prst="rect">
-              <a:avLst/>
-            </a:prstGeom>
-            <a:noFill/>
-          </p:spPr>
-          <p:txBody>
-            <a:bodyPr lIns="0" rIns="0" tIns="0" bIns="0" anchorCtr="1" anchor="ctr" wrap="none"/>
-            <a:lstStyle/>
-            <a:p>
-              <a:pPr algn="l" marL="0" marR="0" indent="0">
-                <a:lnSpc>
-                  <a:spcPts val="1103"/>
-                </a:lnSpc>
-                <a:spcBef>
-                  <a:spcPts val="0"/>
-                </a:spcBef>
-                <a:spcAft>
-                  <a:spcPts val="0"/>
-                </a:spcAft>
-              </a:pPr>
-              <a:r>
-                <a:rPr sz="1103">
-                  <a:solidFill>
-                    <a:srgbClr val="00BF7D">
-                      <a:alpha val="100000"/>
-                    </a:srgbClr>
-                  </a:solidFill>
-                  <a:latin typeface="Arial"/>
-                  <a:cs typeface="Arial"/>
-                </a:rPr>
-                <a:t>DL1</a:t>
-              </a:r>
-            </a:p>
-          </p:txBody>
-        </p:sp>
-        <p:sp>
-          <p:nvSpPr>
-            <p:cNvPr id="45" name="tx45"/>
-            <p:cNvSpPr/>
-            <p:nvPr/>
-          </p:nvSpPr>
-          <p:spPr>
-            <a:xfrm>
-              <a:off x="1518174" y="2036282"/>
-              <a:ext cx="257200" cy="100771"/>
-            </a:xfrm>
-            <a:prstGeom prst="rect">
-              <a:avLst/>
-            </a:prstGeom>
-            <a:noFill/>
-          </p:spPr>
-          <p:txBody>
-            <a:bodyPr lIns="0" rIns="0" tIns="0" bIns="0" anchorCtr="1" anchor="ctr" wrap="none"/>
-            <a:lstStyle/>
-            <a:p>
-              <a:pPr algn="l" marL="0" marR="0" indent="0">
-                <a:lnSpc>
-                  <a:spcPts val="1103"/>
-                </a:lnSpc>
-                <a:spcBef>
-                  <a:spcPts val="0"/>
-                </a:spcBef>
-                <a:spcAft>
-                  <a:spcPts val="0"/>
-                </a:spcAft>
-              </a:pPr>
-              <a:r>
-                <a:rPr sz="1103">
-                  <a:solidFill>
-                    <a:srgbClr val="00BF7D">
-                      <a:alpha val="100000"/>
-                    </a:srgbClr>
-                  </a:solidFill>
-                  <a:latin typeface="Arial"/>
-                  <a:cs typeface="Arial"/>
-                </a:rPr>
-                <a:t>DL2</a:t>
-              </a:r>
-            </a:p>
-          </p:txBody>
-        </p:sp>
-        <p:sp>
-          <p:nvSpPr>
-            <p:cNvPr id="46" name="tx46"/>
-            <p:cNvSpPr/>
-            <p:nvPr/>
-          </p:nvSpPr>
-          <p:spPr>
-            <a:xfrm>
-              <a:off x="2581059" y="1093503"/>
-              <a:ext cx="257200" cy="102551"/>
-            </a:xfrm>
-            <a:prstGeom prst="rect">
-              <a:avLst/>
-            </a:prstGeom>
-            <a:noFill/>
-          </p:spPr>
-          <p:txBody>
-            <a:bodyPr lIns="0" rIns="0" tIns="0" bIns="0" anchorCtr="1" anchor="ctr" wrap="none"/>
-            <a:lstStyle/>
-            <a:p>
-              <a:pPr algn="l" marL="0" marR="0" indent="0">
-                <a:lnSpc>
-                  <a:spcPts val="1103"/>
-                </a:lnSpc>
-                <a:spcBef>
-                  <a:spcPts val="0"/>
-                </a:spcBef>
-                <a:spcAft>
-                  <a:spcPts val="0"/>
-                </a:spcAft>
-              </a:pPr>
-              <a:r>
-                <a:rPr sz="1103">
-                  <a:solidFill>
-                    <a:srgbClr val="00BF7D">
-                      <a:alpha val="100000"/>
-                    </a:srgbClr>
-                  </a:solidFill>
-                  <a:latin typeface="Arial"/>
-                  <a:cs typeface="Arial"/>
-                </a:rPr>
-                <a:t>DL3</a:t>
-              </a:r>
-            </a:p>
-          </p:txBody>
-        </p:sp>
-        <p:sp>
-          <p:nvSpPr>
-            <p:cNvPr id="47" name="tx47"/>
-            <p:cNvSpPr/>
-            <p:nvPr/>
-          </p:nvSpPr>
-          <p:spPr>
-            <a:xfrm>
-              <a:off x="3820217" y="2414057"/>
-              <a:ext cx="257200" cy="100360"/>
-            </a:xfrm>
-            <a:prstGeom prst="rect">
-              <a:avLst/>
-            </a:prstGeom>
-            <a:noFill/>
-          </p:spPr>
-          <p:txBody>
-            <a:bodyPr lIns="0" rIns="0" tIns="0" bIns="0" anchorCtr="1" anchor="ctr" wrap="none"/>
-            <a:lstStyle/>
-            <a:p>
-              <a:pPr algn="l" marL="0" marR="0" indent="0">
-                <a:lnSpc>
-                  <a:spcPts val="1103"/>
-                </a:lnSpc>
-                <a:spcBef>
-                  <a:spcPts val="0"/>
-                </a:spcBef>
-                <a:spcAft>
-                  <a:spcPts val="0"/>
-                </a:spcAft>
-              </a:pPr>
-              <a:r>
-                <a:rPr sz="1103">
-                  <a:solidFill>
-                    <a:srgbClr val="00BF7D">
-                      <a:alpha val="100000"/>
-                    </a:srgbClr>
-                  </a:solidFill>
-                  <a:latin typeface="Arial"/>
-                  <a:cs typeface="Arial"/>
-                </a:rPr>
-                <a:t>DL4</a:t>
-              </a:r>
-            </a:p>
-          </p:txBody>
-        </p:sp>
-        <p:sp>
-          <p:nvSpPr>
-            <p:cNvPr id="48" name="tx48"/>
-            <p:cNvSpPr/>
-            <p:nvPr/>
-          </p:nvSpPr>
-          <p:spPr>
-            <a:xfrm>
-              <a:off x="2004397" y="3128682"/>
-              <a:ext cx="257200" cy="102072"/>
-            </a:xfrm>
-            <a:prstGeom prst="rect">
-              <a:avLst/>
-            </a:prstGeom>
-            <a:noFill/>
-          </p:spPr>
-          <p:txBody>
-            <a:bodyPr lIns="0" rIns="0" tIns="0" bIns="0" anchorCtr="1" anchor="ctr" wrap="none"/>
-            <a:lstStyle/>
-            <a:p>
-              <a:pPr algn="l" marL="0" marR="0" indent="0">
-                <a:lnSpc>
-                  <a:spcPts val="1103"/>
-                </a:lnSpc>
-                <a:spcBef>
-                  <a:spcPts val="0"/>
-                </a:spcBef>
-                <a:spcAft>
-                  <a:spcPts val="0"/>
-                </a:spcAft>
-              </a:pPr>
-              <a:r>
-                <a:rPr sz="1103">
-                  <a:solidFill>
-                    <a:srgbClr val="00BF7D">
-                      <a:alpha val="100000"/>
-                    </a:srgbClr>
-                  </a:solidFill>
-                  <a:latin typeface="Arial"/>
-                  <a:cs typeface="Arial"/>
-                </a:rPr>
-                <a:t>DL5</a:t>
-              </a:r>
-            </a:p>
-          </p:txBody>
-        </p:sp>
-        <p:sp>
-          <p:nvSpPr>
-            <p:cNvPr id="49" name="tx49"/>
-            <p:cNvSpPr/>
-            <p:nvPr/>
-          </p:nvSpPr>
-          <p:spPr>
-            <a:xfrm>
-              <a:off x="6087830" y="2783430"/>
-              <a:ext cx="296016" cy="100771"/>
-            </a:xfrm>
-            <a:prstGeom prst="rect">
-              <a:avLst/>
-            </a:prstGeom>
-            <a:noFill/>
-          </p:spPr>
-          <p:txBody>
-            <a:bodyPr lIns="0" rIns="0" tIns="0" bIns="0" anchorCtr="1" anchor="ctr" wrap="none"/>
-            <a:lstStyle/>
-            <a:p>
-              <a:pPr algn="l" marL="0" marR="0" indent="0">
-                <a:lnSpc>
-                  <a:spcPts val="1103"/>
-                </a:lnSpc>
-                <a:spcBef>
-                  <a:spcPts val="0"/>
-                </a:spcBef>
-                <a:spcAft>
-                  <a:spcPts val="0"/>
-                </a:spcAft>
-              </a:pPr>
-              <a:r>
-                <a:rPr sz="1103">
-                  <a:solidFill>
-                    <a:srgbClr val="00B0F6">
-                      <a:alpha val="100000"/>
-                    </a:srgbClr>
-                  </a:solidFill>
-                  <a:latin typeface="Arial"/>
-                  <a:cs typeface="Arial"/>
-                </a:rPr>
-                <a:t>DM1</a:t>
-              </a:r>
-            </a:p>
-          </p:txBody>
-        </p:sp>
-        <p:sp>
-          <p:nvSpPr>
-            <p:cNvPr id="50" name="tx50"/>
-            <p:cNvSpPr/>
-            <p:nvPr/>
-          </p:nvSpPr>
-          <p:spPr>
-            <a:xfrm>
-              <a:off x="3254369" y="2155174"/>
-              <a:ext cx="296016" cy="100771"/>
-            </a:xfrm>
-            <a:prstGeom prst="rect">
-              <a:avLst/>
-            </a:prstGeom>
-            <a:noFill/>
-          </p:spPr>
-          <p:txBody>
-            <a:bodyPr lIns="0" rIns="0" tIns="0" bIns="0" anchorCtr="1" anchor="ctr" wrap="none"/>
-            <a:lstStyle/>
-            <a:p>
-              <a:pPr algn="l" marL="0" marR="0" indent="0">
-                <a:lnSpc>
-                  <a:spcPts val="1103"/>
-                </a:lnSpc>
-                <a:spcBef>
-                  <a:spcPts val="0"/>
-                </a:spcBef>
-                <a:spcAft>
-                  <a:spcPts val="0"/>
-                </a:spcAft>
-              </a:pPr>
-              <a:r>
-                <a:rPr sz="1103">
-                  <a:solidFill>
-                    <a:srgbClr val="00B0F6">
-                      <a:alpha val="100000"/>
-                    </a:srgbClr>
-                  </a:solidFill>
-                  <a:latin typeface="Arial"/>
-                  <a:cs typeface="Arial"/>
-                </a:rPr>
-                <a:t>DM2</a:t>
-              </a:r>
-            </a:p>
-          </p:txBody>
-        </p:sp>
-        <p:sp>
-          <p:nvSpPr>
-            <p:cNvPr id="51" name="tx51"/>
-            <p:cNvSpPr/>
-            <p:nvPr/>
-          </p:nvSpPr>
-          <p:spPr>
-            <a:xfrm>
-              <a:off x="2865201" y="2317374"/>
-              <a:ext cx="296016" cy="102551"/>
-            </a:xfrm>
-            <a:prstGeom prst="rect">
-              <a:avLst/>
-            </a:prstGeom>
-            <a:noFill/>
-          </p:spPr>
-          <p:txBody>
-            <a:bodyPr lIns="0" rIns="0" tIns="0" bIns="0" anchorCtr="1" anchor="ctr" wrap="none"/>
-            <a:lstStyle/>
-            <a:p>
-              <a:pPr algn="l" marL="0" marR="0" indent="0">
-                <a:lnSpc>
-                  <a:spcPts val="1103"/>
-                </a:lnSpc>
-                <a:spcBef>
-                  <a:spcPts val="0"/>
-                </a:spcBef>
-                <a:spcAft>
-                  <a:spcPts val="0"/>
-                </a:spcAft>
-              </a:pPr>
-              <a:r>
-                <a:rPr sz="1103">
-                  <a:solidFill>
-                    <a:srgbClr val="00B0F6">
-                      <a:alpha val="100000"/>
-                    </a:srgbClr>
-                  </a:solidFill>
-                  <a:latin typeface="Arial"/>
-                  <a:cs typeface="Arial"/>
-                </a:rPr>
-                <a:t>DM3</a:t>
-              </a:r>
-            </a:p>
-          </p:txBody>
-        </p:sp>
-        <p:sp>
-          <p:nvSpPr>
-            <p:cNvPr id="52" name="tx52"/>
-            <p:cNvSpPr/>
-            <p:nvPr/>
-          </p:nvSpPr>
-          <p:spPr>
-            <a:xfrm>
-              <a:off x="5210657" y="3023449"/>
-              <a:ext cx="296016" cy="100360"/>
-            </a:xfrm>
-            <a:prstGeom prst="rect">
-              <a:avLst/>
-            </a:prstGeom>
-            <a:noFill/>
-          </p:spPr>
-          <p:txBody>
-            <a:bodyPr lIns="0" rIns="0" tIns="0" bIns="0" anchorCtr="1" anchor="ctr" wrap="none"/>
-            <a:lstStyle/>
-            <a:p>
-              <a:pPr algn="l" marL="0" marR="0" indent="0">
-                <a:lnSpc>
-                  <a:spcPts val="1103"/>
-                </a:lnSpc>
-                <a:spcBef>
-                  <a:spcPts val="0"/>
-                </a:spcBef>
-                <a:spcAft>
-                  <a:spcPts val="0"/>
-                </a:spcAft>
-              </a:pPr>
-              <a:r>
-                <a:rPr sz="1103">
-                  <a:solidFill>
-                    <a:srgbClr val="00B0F6">
-                      <a:alpha val="100000"/>
-                    </a:srgbClr>
-                  </a:solidFill>
-                  <a:latin typeface="Arial"/>
-                  <a:cs typeface="Arial"/>
-                </a:rPr>
-                <a:t>DM4</a:t>
-              </a:r>
-            </a:p>
-          </p:txBody>
-        </p:sp>
-        <p:sp>
-          <p:nvSpPr>
-            <p:cNvPr id="53" name="tx53"/>
-            <p:cNvSpPr/>
-            <p:nvPr/>
-          </p:nvSpPr>
-          <p:spPr>
-            <a:xfrm>
-              <a:off x="3103685" y="1861944"/>
-              <a:ext cx="296016" cy="102072"/>
-            </a:xfrm>
-            <a:prstGeom prst="rect">
-              <a:avLst/>
-            </a:prstGeom>
-            <a:noFill/>
-          </p:spPr>
-          <p:txBody>
-            <a:bodyPr lIns="0" rIns="0" tIns="0" bIns="0" anchorCtr="1" anchor="ctr" wrap="none"/>
-            <a:lstStyle/>
-            <a:p>
-              <a:pPr algn="l" marL="0" marR="0" indent="0">
-                <a:lnSpc>
-                  <a:spcPts val="1103"/>
-                </a:lnSpc>
-                <a:spcBef>
-                  <a:spcPts val="0"/>
-                </a:spcBef>
-                <a:spcAft>
-                  <a:spcPts val="0"/>
-                </a:spcAft>
-              </a:pPr>
-              <a:r>
-                <a:rPr sz="1103">
-                  <a:solidFill>
-                    <a:srgbClr val="00B0F6">
-                      <a:alpha val="100000"/>
-                    </a:srgbClr>
-                  </a:solidFill>
-                  <a:latin typeface="Arial"/>
-                  <a:cs typeface="Arial"/>
-                </a:rPr>
-                <a:t>DM5</a:t>
-              </a:r>
-            </a:p>
-          </p:txBody>
-        </p:sp>
-        <p:sp>
-          <p:nvSpPr>
-            <p:cNvPr id="54" name="tx54"/>
-            <p:cNvSpPr/>
-            <p:nvPr/>
-          </p:nvSpPr>
-          <p:spPr>
-            <a:xfrm>
-              <a:off x="5764458" y="2200059"/>
-              <a:ext cx="210305" cy="100771"/>
-            </a:xfrm>
-            <a:prstGeom prst="rect">
-              <a:avLst/>
-            </a:prstGeom>
-            <a:noFill/>
-          </p:spPr>
-          <p:txBody>
-            <a:bodyPr lIns="0" rIns="0" tIns="0" bIns="0" anchorCtr="1" anchor="ctr" wrap="none"/>
-            <a:lstStyle/>
-            <a:p>
-              <a:pPr algn="l" marL="0" marR="0" indent="0">
-                <a:lnSpc>
-                  <a:spcPts val="1103"/>
-                </a:lnSpc>
-                <a:spcBef>
-                  <a:spcPts val="0"/>
-                </a:spcBef>
-                <a:spcAft>
-                  <a:spcPts val="0"/>
-                </a:spcAft>
-              </a:pPr>
-              <a:r>
-                <a:rPr sz="1103">
-                  <a:solidFill>
-                    <a:srgbClr val="E76BF3">
-                      <a:alpha val="100000"/>
-                    </a:srgbClr>
-                  </a:solidFill>
-                  <a:latin typeface="Arial"/>
-                  <a:cs typeface="Arial"/>
-                </a:rPr>
-                <a:t>W1</a:t>
-              </a:r>
-            </a:p>
-          </p:txBody>
-        </p:sp>
-        <p:sp>
-          <p:nvSpPr>
-            <p:cNvPr id="55" name="tx55"/>
-            <p:cNvSpPr/>
-            <p:nvPr/>
-          </p:nvSpPr>
-          <p:spPr>
-            <a:xfrm>
-              <a:off x="6317130" y="1703786"/>
-              <a:ext cx="210305" cy="100771"/>
-            </a:xfrm>
-            <a:prstGeom prst="rect">
-              <a:avLst/>
-            </a:prstGeom>
-            <a:noFill/>
-          </p:spPr>
-          <p:txBody>
-            <a:bodyPr lIns="0" rIns="0" tIns="0" bIns="0" anchorCtr="1" anchor="ctr" wrap="none"/>
-            <a:lstStyle/>
-            <a:p>
-              <a:pPr algn="l" marL="0" marR="0" indent="0">
-                <a:lnSpc>
-                  <a:spcPts val="1103"/>
-                </a:lnSpc>
-                <a:spcBef>
-                  <a:spcPts val="0"/>
-                </a:spcBef>
-                <a:spcAft>
-                  <a:spcPts val="0"/>
-                </a:spcAft>
-              </a:pPr>
-              <a:r>
-                <a:rPr sz="1103">
-                  <a:solidFill>
-                    <a:srgbClr val="E76BF3">
-                      <a:alpha val="100000"/>
-                    </a:srgbClr>
-                  </a:solidFill>
-                  <a:latin typeface="Arial"/>
-                  <a:cs typeface="Arial"/>
-                </a:rPr>
-                <a:t>W2</a:t>
-              </a:r>
-            </a:p>
-          </p:txBody>
-        </p:sp>
-        <p:sp>
-          <p:nvSpPr>
-            <p:cNvPr id="56" name="tx56"/>
-            <p:cNvSpPr/>
-            <p:nvPr/>
-          </p:nvSpPr>
-          <p:spPr>
-            <a:xfrm>
-              <a:off x="5352602" y="2577944"/>
-              <a:ext cx="210305" cy="102551"/>
-            </a:xfrm>
-            <a:prstGeom prst="rect">
-              <a:avLst/>
-            </a:prstGeom>
-            <a:noFill/>
-          </p:spPr>
-          <p:txBody>
-            <a:bodyPr lIns="0" rIns="0" tIns="0" bIns="0" anchorCtr="1" anchor="ctr" wrap="none"/>
-            <a:lstStyle/>
-            <a:p>
-              <a:pPr algn="l" marL="0" marR="0" indent="0">
-                <a:lnSpc>
-                  <a:spcPts val="1103"/>
-                </a:lnSpc>
-                <a:spcBef>
-                  <a:spcPts val="0"/>
-                </a:spcBef>
-                <a:spcAft>
-                  <a:spcPts val="0"/>
-                </a:spcAft>
-              </a:pPr>
-              <a:r>
-                <a:rPr sz="1103">
-                  <a:solidFill>
-                    <a:srgbClr val="E76BF3">
-                      <a:alpha val="100000"/>
-                    </a:srgbClr>
-                  </a:solidFill>
-                  <a:latin typeface="Arial"/>
-                  <a:cs typeface="Arial"/>
-                </a:rPr>
-                <a:t>W3</a:t>
-              </a:r>
-            </a:p>
-          </p:txBody>
-        </p:sp>
-        <p:sp>
-          <p:nvSpPr>
-            <p:cNvPr id="57" name="tx57"/>
-            <p:cNvSpPr/>
-            <p:nvPr/>
-          </p:nvSpPr>
-          <p:spPr>
-            <a:xfrm>
-              <a:off x="6466773" y="2487756"/>
-              <a:ext cx="210305" cy="100360"/>
-            </a:xfrm>
-            <a:prstGeom prst="rect">
-              <a:avLst/>
-            </a:prstGeom>
-            <a:noFill/>
-          </p:spPr>
-          <p:txBody>
-            <a:bodyPr lIns="0" rIns="0" tIns="0" bIns="0" anchorCtr="1" anchor="ctr" wrap="none"/>
-            <a:lstStyle/>
-            <a:p>
-              <a:pPr algn="l" marL="0" marR="0" indent="0">
-                <a:lnSpc>
-                  <a:spcPts val="1103"/>
-                </a:lnSpc>
-                <a:spcBef>
-                  <a:spcPts val="0"/>
-                </a:spcBef>
-                <a:spcAft>
-                  <a:spcPts val="0"/>
-                </a:spcAft>
-              </a:pPr>
-              <a:r>
-                <a:rPr sz="1103">
-                  <a:solidFill>
-                    <a:srgbClr val="E76BF3">
-                      <a:alpha val="100000"/>
-                    </a:srgbClr>
-                  </a:solidFill>
-                  <a:latin typeface="Arial"/>
-                  <a:cs typeface="Arial"/>
-                </a:rPr>
-                <a:t>W4</a:t>
-              </a:r>
-            </a:p>
-          </p:txBody>
-        </p:sp>
-        <p:sp>
-          <p:nvSpPr>
-            <p:cNvPr id="58" name="tx58"/>
-            <p:cNvSpPr/>
-            <p:nvPr/>
-          </p:nvSpPr>
-          <p:spPr>
-            <a:xfrm>
-              <a:off x="4985316" y="2767942"/>
-              <a:ext cx="210305" cy="102072"/>
-            </a:xfrm>
-            <a:prstGeom prst="rect">
-              <a:avLst/>
-            </a:prstGeom>
-            <a:noFill/>
-          </p:spPr>
-          <p:txBody>
-            <a:bodyPr lIns="0" rIns="0" tIns="0" bIns="0" anchorCtr="1" anchor="ctr" wrap="none"/>
-            <a:lstStyle/>
-            <a:p>
-              <a:pPr algn="l" marL="0" marR="0" indent="0">
-                <a:lnSpc>
-                  <a:spcPts val="1103"/>
-                </a:lnSpc>
-                <a:spcBef>
-                  <a:spcPts val="0"/>
-                </a:spcBef>
-                <a:spcAft>
-                  <a:spcPts val="0"/>
-                </a:spcAft>
-              </a:pPr>
-              <a:r>
-                <a:rPr sz="1103">
-                  <a:solidFill>
-                    <a:srgbClr val="E76BF3">
-                      <a:alpha val="100000"/>
-                    </a:srgbClr>
-                  </a:solidFill>
-                  <a:latin typeface="Arial"/>
-                  <a:cs typeface="Arial"/>
-                </a:rPr>
-                <a:t>W5</a:t>
-              </a:r>
-            </a:p>
-          </p:txBody>
-        </p:sp>
-        <p:sp>
-          <p:nvSpPr>
-            <p:cNvPr id="59" name="pg59"/>
+            <p:cNvPr id="33" name="pg33"/>
             <p:cNvSpPr/>
             <p:nvPr/>
           </p:nvSpPr>
@@ -4520,7 +3330,7 @@
         </p:sp>
         <p:sp>
           <p:nvSpPr>
-            <p:cNvPr id="60" name="pg60"/>
+            <p:cNvPr id="34" name="pg34"/>
             <p:cNvSpPr/>
             <p:nvPr/>
           </p:nvSpPr>
@@ -4560,7 +3370,7 @@
         </p:sp>
         <p:sp>
           <p:nvSpPr>
-            <p:cNvPr id="61" name="pg61"/>
+            <p:cNvPr id="35" name="pg35"/>
             <p:cNvSpPr/>
             <p:nvPr/>
           </p:nvSpPr>
@@ -4606,7 +3416,7 @@
         </p:sp>
         <p:sp>
           <p:nvSpPr>
-            <p:cNvPr id="62" name="pg62"/>
+            <p:cNvPr id="36" name="pg36"/>
             <p:cNvSpPr/>
             <p:nvPr/>
           </p:nvSpPr>
@@ -4649,7 +3459,7 @@
         </p:sp>
         <p:sp>
           <p:nvSpPr>
-            <p:cNvPr id="63" name="pg63"/>
+            <p:cNvPr id="37" name="pg37"/>
             <p:cNvSpPr/>
             <p:nvPr/>
           </p:nvSpPr>
@@ -4689,7 +3499,7 @@
         </p:sp>
         <p:sp>
           <p:nvSpPr>
-            <p:cNvPr id="64" name="pl64"/>
+            <p:cNvPr id="38" name="pl38"/>
             <p:cNvSpPr/>
             <p:nvPr/>
           </p:nvSpPr>
@@ -4729,7 +3539,7 @@
         </p:sp>
         <p:sp>
           <p:nvSpPr>
-            <p:cNvPr id="65" name="pl65"/>
+            <p:cNvPr id="39" name="pl39"/>
             <p:cNvSpPr/>
             <p:nvPr/>
           </p:nvSpPr>
@@ -4772,7 +3582,7 @@
         </p:sp>
         <p:sp>
           <p:nvSpPr>
-            <p:cNvPr id="66" name="pl66"/>
+            <p:cNvPr id="40" name="pl40"/>
             <p:cNvSpPr/>
             <p:nvPr/>
           </p:nvSpPr>
@@ -4812,7 +3622,7 @@
         </p:sp>
         <p:sp>
           <p:nvSpPr>
-            <p:cNvPr id="67" name="pl67"/>
+            <p:cNvPr id="41" name="pl41"/>
             <p:cNvSpPr/>
             <p:nvPr/>
           </p:nvSpPr>
@@ -4855,7 +3665,7 @@
         </p:sp>
         <p:sp>
           <p:nvSpPr>
-            <p:cNvPr id="68" name="pl68"/>
+            <p:cNvPr id="42" name="pl42"/>
             <p:cNvSpPr/>
             <p:nvPr/>
           </p:nvSpPr>
@@ -4895,7 +3705,7 @@
         </p:sp>
         <p:sp>
           <p:nvSpPr>
-            <p:cNvPr id="69" name="pl69"/>
+            <p:cNvPr id="43" name="pl43"/>
             <p:cNvSpPr/>
             <p:nvPr/>
           </p:nvSpPr>
@@ -4938,7 +3748,7 @@
         </p:sp>
         <p:sp>
           <p:nvSpPr>
-            <p:cNvPr id="70" name="pl70"/>
+            <p:cNvPr id="44" name="pl44"/>
             <p:cNvSpPr/>
             <p:nvPr/>
           </p:nvSpPr>
@@ -4978,7 +3788,7 @@
         </p:sp>
         <p:sp>
           <p:nvSpPr>
-            <p:cNvPr id="71" name="pl71"/>
+            <p:cNvPr id="45" name="pl45"/>
             <p:cNvSpPr/>
             <p:nvPr/>
           </p:nvSpPr>
@@ -5021,7 +3831,7 @@
         </p:sp>
         <p:sp>
           <p:nvSpPr>
-            <p:cNvPr id="72" name="pl72"/>
+            <p:cNvPr id="46" name="pl46"/>
             <p:cNvSpPr/>
             <p:nvPr/>
           </p:nvSpPr>
@@ -5061,7 +3871,7 @@
         </p:sp>
         <p:sp>
           <p:nvSpPr>
-            <p:cNvPr id="73" name="pl73"/>
+            <p:cNvPr id="47" name="pl47"/>
             <p:cNvSpPr/>
             <p:nvPr/>
           </p:nvSpPr>
@@ -5104,7 +3914,7 @@
         </p:sp>
         <p:sp>
           <p:nvSpPr>
-            <p:cNvPr id="74" name="pl74"/>
+            <p:cNvPr id="48" name="pl48"/>
             <p:cNvSpPr/>
             <p:nvPr/>
           </p:nvSpPr>
@@ -5144,7 +3954,7 @@
         </p:sp>
         <p:sp>
           <p:nvSpPr>
-            <p:cNvPr id="75" name="pl75"/>
+            <p:cNvPr id="49" name="pl49"/>
             <p:cNvSpPr/>
             <p:nvPr/>
           </p:nvSpPr>
@@ -5187,7 +3997,7 @@
         </p:sp>
         <p:sp>
           <p:nvSpPr>
-            <p:cNvPr id="76" name="pl76"/>
+            <p:cNvPr id="50" name="pl50"/>
             <p:cNvSpPr/>
             <p:nvPr/>
           </p:nvSpPr>
@@ -5227,7 +4037,7 @@
         </p:sp>
         <p:sp>
           <p:nvSpPr>
-            <p:cNvPr id="77" name="pl77"/>
+            <p:cNvPr id="51" name="pl51"/>
             <p:cNvSpPr/>
             <p:nvPr/>
           </p:nvSpPr>
@@ -5270,7 +4080,7 @@
         </p:sp>
         <p:sp>
           <p:nvSpPr>
-            <p:cNvPr id="78" name="pl78"/>
+            <p:cNvPr id="52" name="pl52"/>
             <p:cNvSpPr/>
             <p:nvPr/>
           </p:nvSpPr>
@@ -5310,7 +4120,7 @@
         </p:sp>
         <p:sp>
           <p:nvSpPr>
-            <p:cNvPr id="79" name="pl79"/>
+            <p:cNvPr id="53" name="pl53"/>
             <p:cNvSpPr/>
             <p:nvPr/>
           </p:nvSpPr>
@@ -5353,7 +4163,7 @@
         </p:sp>
         <p:sp>
           <p:nvSpPr>
-            <p:cNvPr id="80" name="tx80"/>
+            <p:cNvPr id="54" name="tx54"/>
             <p:cNvSpPr/>
             <p:nvPr/>
           </p:nvSpPr>
@@ -5399,7 +4209,7 @@
         </p:sp>
         <p:sp>
           <p:nvSpPr>
-            <p:cNvPr id="81" name="tx81"/>
+            <p:cNvPr id="55" name="tx55"/>
             <p:cNvSpPr/>
             <p:nvPr/>
           </p:nvSpPr>
@@ -5445,7 +4255,7 @@
         </p:sp>
         <p:sp>
           <p:nvSpPr>
-            <p:cNvPr id="82" name="tx82"/>
+            <p:cNvPr id="56" name="tx56"/>
             <p:cNvSpPr/>
             <p:nvPr/>
           </p:nvSpPr>
@@ -5491,7 +4301,7 @@
         </p:sp>
         <p:sp>
           <p:nvSpPr>
-            <p:cNvPr id="83" name="tx83"/>
+            <p:cNvPr id="57" name="tx57"/>
             <p:cNvSpPr/>
             <p:nvPr/>
           </p:nvSpPr>
@@ -5537,7 +4347,7 @@
         </p:sp>
         <p:sp>
           <p:nvSpPr>
-            <p:cNvPr id="84" name="tx84"/>
+            <p:cNvPr id="58" name="tx58"/>
             <p:cNvSpPr/>
             <p:nvPr/>
           </p:nvSpPr>
@@ -5583,7 +4393,7 @@
         </p:sp>
         <p:sp>
           <p:nvSpPr>
-            <p:cNvPr id="85" name="tx85"/>
+            <p:cNvPr id="59" name="tx59"/>
             <p:cNvSpPr/>
             <p:nvPr/>
           </p:nvSpPr>
@@ -5629,7 +4439,7 @@
         </p:sp>
         <p:sp>
           <p:nvSpPr>
-            <p:cNvPr id="86" name="tx86"/>
+            <p:cNvPr id="60" name="tx60"/>
             <p:cNvSpPr/>
             <p:nvPr/>
           </p:nvSpPr>
@@ -5675,7 +4485,7 @@
         </p:sp>
         <p:sp>
           <p:nvSpPr>
-            <p:cNvPr id="87" name="tx87"/>
+            <p:cNvPr id="61" name="tx61"/>
             <p:cNvSpPr/>
             <p:nvPr/>
           </p:nvSpPr>
@@ -5721,7 +4531,7 @@
         </p:sp>
         <p:sp>
           <p:nvSpPr>
-            <p:cNvPr id="88" name="pl88"/>
+            <p:cNvPr id="62" name="pl62"/>
             <p:cNvSpPr/>
             <p:nvPr/>
           </p:nvSpPr>
@@ -5761,7 +4571,7 @@
         </p:sp>
         <p:sp>
           <p:nvSpPr>
-            <p:cNvPr id="89" name="tx89"/>
+            <p:cNvPr id="63" name="tx63"/>
             <p:cNvSpPr/>
             <p:nvPr/>
           </p:nvSpPr>
@@ -5807,7 +4617,7 @@
         </p:sp>
         <p:sp>
           <p:nvSpPr>
-            <p:cNvPr id="90" name="tx90"/>
+            <p:cNvPr id="64" name="tx64"/>
             <p:cNvSpPr/>
             <p:nvPr/>
           </p:nvSpPr>
@@ -5853,7 +4663,7 @@
         </p:sp>
         <p:sp>
           <p:nvSpPr>
-            <p:cNvPr id="91" name="tx91"/>
+            <p:cNvPr id="65" name="tx65"/>
             <p:cNvSpPr/>
             <p:nvPr/>
           </p:nvSpPr>
@@ -5899,7 +4709,7 @@
         </p:sp>
         <p:sp>
           <p:nvSpPr>
-            <p:cNvPr id="92" name="tx92"/>
+            <p:cNvPr id="66" name="tx66"/>
             <p:cNvSpPr/>
             <p:nvPr/>
           </p:nvSpPr>
@@ -5945,7 +4755,7 @@
         </p:sp>
         <p:sp>
           <p:nvSpPr>
-            <p:cNvPr id="93" name="pl93"/>
+            <p:cNvPr id="67" name="pl67"/>
             <p:cNvSpPr/>
             <p:nvPr/>
           </p:nvSpPr>
@@ -5985,7 +4795,7 @@
         </p:sp>
         <p:sp>
           <p:nvSpPr>
-            <p:cNvPr id="94" name="pl94"/>
+            <p:cNvPr id="68" name="pl68"/>
             <p:cNvSpPr/>
             <p:nvPr/>
           </p:nvSpPr>
@@ -6025,7 +4835,7 @@
         </p:sp>
         <p:sp>
           <p:nvSpPr>
-            <p:cNvPr id="95" name="pl95"/>
+            <p:cNvPr id="69" name="pl69"/>
             <p:cNvSpPr/>
             <p:nvPr/>
           </p:nvSpPr>
@@ -6065,7 +4875,7 @@
         </p:sp>
         <p:sp>
           <p:nvSpPr>
-            <p:cNvPr id="96" name="pl96"/>
+            <p:cNvPr id="70" name="pl70"/>
             <p:cNvSpPr/>
             <p:nvPr/>
           </p:nvSpPr>
@@ -6105,7 +4915,7 @@
         </p:sp>
         <p:sp>
           <p:nvSpPr>
-            <p:cNvPr id="97" name="pl97"/>
+            <p:cNvPr id="71" name="pl71"/>
             <p:cNvSpPr/>
             <p:nvPr/>
           </p:nvSpPr>
@@ -6145,7 +4955,7 @@
         </p:sp>
         <p:sp>
           <p:nvSpPr>
-            <p:cNvPr id="98" name="pl98"/>
+            <p:cNvPr id="72" name="pl72"/>
             <p:cNvSpPr/>
             <p:nvPr/>
           </p:nvSpPr>
@@ -6185,7 +4995,7 @@
         </p:sp>
         <p:sp>
           <p:nvSpPr>
-            <p:cNvPr id="99" name="pl99"/>
+            <p:cNvPr id="73" name="pl73"/>
             <p:cNvSpPr/>
             <p:nvPr/>
           </p:nvSpPr>
@@ -6225,7 +5035,7 @@
         </p:sp>
         <p:sp>
           <p:nvSpPr>
-            <p:cNvPr id="100" name="pl100"/>
+            <p:cNvPr id="74" name="pl74"/>
             <p:cNvSpPr/>
             <p:nvPr/>
           </p:nvSpPr>
@@ -6265,7 +5075,7 @@
         </p:sp>
         <p:sp>
           <p:nvSpPr>
-            <p:cNvPr id="101" name="pl101"/>
+            <p:cNvPr id="75" name="pl75"/>
             <p:cNvSpPr/>
             <p:nvPr/>
           </p:nvSpPr>
@@ -6305,7 +5115,7 @@
         </p:sp>
         <p:sp>
           <p:nvSpPr>
-            <p:cNvPr id="102" name="pl102"/>
+            <p:cNvPr id="76" name="pl76"/>
             <p:cNvSpPr/>
             <p:nvPr/>
           </p:nvSpPr>
@@ -6345,7 +5155,7 @@
         </p:sp>
         <p:sp>
           <p:nvSpPr>
-            <p:cNvPr id="103" name="tx103"/>
+            <p:cNvPr id="77" name="tx77"/>
             <p:cNvSpPr/>
             <p:nvPr/>
           </p:nvSpPr>
@@ -6391,7 +5201,7 @@
         </p:sp>
         <p:sp>
           <p:nvSpPr>
-            <p:cNvPr id="104" name="tx104"/>
+            <p:cNvPr id="78" name="tx78"/>
             <p:cNvSpPr/>
             <p:nvPr/>
           </p:nvSpPr>
@@ -6437,7 +5247,7 @@
         </p:sp>
         <p:sp>
           <p:nvSpPr>
-            <p:cNvPr id="105" name="tx105"/>
+            <p:cNvPr id="79" name="tx79"/>
             <p:cNvSpPr/>
             <p:nvPr/>
           </p:nvSpPr>
@@ -6483,7 +5293,7 @@
         </p:sp>
         <p:sp>
           <p:nvSpPr>
-            <p:cNvPr id="106" name="tx106"/>
+            <p:cNvPr id="80" name="tx80"/>
             <p:cNvSpPr/>
             <p:nvPr/>
           </p:nvSpPr>
@@ -6529,7 +5339,7 @@
         </p:sp>
         <p:sp>
           <p:nvSpPr>
-            <p:cNvPr id="107" name="tx107"/>
+            <p:cNvPr id="81" name="tx81"/>
             <p:cNvSpPr/>
             <p:nvPr/>
           </p:nvSpPr>
@@ -6575,7 +5385,7 @@
         </p:sp>
         <p:sp>
           <p:nvSpPr>
-            <p:cNvPr id="108" name="tx108"/>
+            <p:cNvPr id="82" name="tx82"/>
             <p:cNvSpPr/>
             <p:nvPr/>
           </p:nvSpPr>
@@ -6621,7 +5431,7 @@
         </p:sp>
         <p:sp>
           <p:nvSpPr>
-            <p:cNvPr id="109" name="tx109"/>
+            <p:cNvPr id="83" name="tx83"/>
             <p:cNvSpPr/>
             <p:nvPr/>
           </p:nvSpPr>
@@ -6667,7 +5477,7 @@
         </p:sp>
         <p:sp>
           <p:nvSpPr>
-            <p:cNvPr id="110" name="rc110"/>
+            <p:cNvPr id="84" name="rc84"/>
             <p:cNvSpPr/>
             <p:nvPr/>
           </p:nvSpPr>
@@ -6693,7 +5503,7 @@
         </p:sp>
         <p:sp>
           <p:nvSpPr>
-            <p:cNvPr id="111" name="tx111"/>
+            <p:cNvPr id="85" name="tx85"/>
             <p:cNvSpPr/>
             <p:nvPr/>
           </p:nvSpPr>
@@ -6739,7 +5549,7 @@
         </p:sp>
         <p:sp>
           <p:nvSpPr>
-            <p:cNvPr id="112" name="pt112"/>
+            <p:cNvPr id="86" name="pt86"/>
             <p:cNvSpPr/>
             <p:nvPr/>
           </p:nvSpPr>
@@ -6774,7 +5584,7 @@
         </p:sp>
         <p:sp>
           <p:nvSpPr>
-            <p:cNvPr id="113" name="rc113"/>
+            <p:cNvPr id="87" name="rc87"/>
             <p:cNvSpPr/>
             <p:nvPr/>
           </p:nvSpPr>
@@ -6800,7 +5610,7 @@
         </p:sp>
         <p:sp>
           <p:nvSpPr>
-            <p:cNvPr id="114" name="pt114"/>
+            <p:cNvPr id="88" name="pt88"/>
             <p:cNvSpPr/>
             <p:nvPr/>
           </p:nvSpPr>
@@ -6835,7 +5645,7 @@
         </p:sp>
         <p:sp>
           <p:nvSpPr>
-            <p:cNvPr id="115" name="rc115"/>
+            <p:cNvPr id="89" name="rc89"/>
             <p:cNvSpPr/>
             <p:nvPr/>
           </p:nvSpPr>
@@ -6861,7 +5671,7 @@
         </p:sp>
         <p:sp>
           <p:nvSpPr>
-            <p:cNvPr id="116" name="pt116"/>
+            <p:cNvPr id="90" name="pt90"/>
             <p:cNvSpPr/>
             <p:nvPr/>
           </p:nvSpPr>
@@ -6896,7 +5706,7 @@
         </p:sp>
         <p:sp>
           <p:nvSpPr>
-            <p:cNvPr id="117" name="rc117"/>
+            <p:cNvPr id="91" name="rc91"/>
             <p:cNvSpPr/>
             <p:nvPr/>
           </p:nvSpPr>
@@ -6922,7 +5732,7 @@
         </p:sp>
         <p:sp>
           <p:nvSpPr>
-            <p:cNvPr id="118" name="pt118"/>
+            <p:cNvPr id="92" name="pt92"/>
             <p:cNvSpPr/>
             <p:nvPr/>
           </p:nvSpPr>
@@ -6957,7 +5767,7 @@
         </p:sp>
         <p:sp>
           <p:nvSpPr>
-            <p:cNvPr id="119" name="rc119"/>
+            <p:cNvPr id="93" name="rc93"/>
             <p:cNvSpPr/>
             <p:nvPr/>
           </p:nvSpPr>
@@ -6983,7 +5793,7 @@
         </p:sp>
         <p:sp>
           <p:nvSpPr>
-            <p:cNvPr id="120" name="pt120"/>
+            <p:cNvPr id="94" name="pt94"/>
             <p:cNvSpPr/>
             <p:nvPr/>
           </p:nvSpPr>
@@ -7018,7 +5828,7 @@
         </p:sp>
         <p:sp>
           <p:nvSpPr>
-            <p:cNvPr id="121" name="rc121"/>
+            <p:cNvPr id="95" name="rc95"/>
             <p:cNvSpPr/>
             <p:nvPr/>
           </p:nvSpPr>
@@ -7044,7 +5854,7 @@
         </p:sp>
         <p:sp>
           <p:nvSpPr>
-            <p:cNvPr id="122" name="tx122"/>
+            <p:cNvPr id="96" name="tx96"/>
             <p:cNvSpPr/>
             <p:nvPr/>
           </p:nvSpPr>
@@ -7090,7 +5900,7 @@
         </p:sp>
         <p:sp>
           <p:nvSpPr>
-            <p:cNvPr id="123" name="tx123"/>
+            <p:cNvPr id="97" name="tx97"/>
             <p:cNvSpPr/>
             <p:nvPr/>
           </p:nvSpPr>
@@ -7136,7 +5946,7 @@
         </p:sp>
         <p:sp>
           <p:nvSpPr>
-            <p:cNvPr id="124" name="tx124"/>
+            <p:cNvPr id="98" name="tx98"/>
             <p:cNvSpPr/>
             <p:nvPr/>
           </p:nvSpPr>
@@ -7182,7 +5992,7 @@
         </p:sp>
         <p:sp>
           <p:nvSpPr>
-            <p:cNvPr id="125" name="tx125"/>
+            <p:cNvPr id="99" name="tx99"/>
             <p:cNvSpPr/>
             <p:nvPr/>
           </p:nvSpPr>
@@ -7228,7 +6038,7 @@
         </p:sp>
         <p:sp>
           <p:nvSpPr>
-            <p:cNvPr id="126" name="tx126"/>
+            <p:cNvPr id="100" name="tx100"/>
             <p:cNvSpPr/>
             <p:nvPr/>
           </p:nvSpPr>

</xml_diff>

<commit_message>
resaved nmds to ppt with correct labels
</commit_message>
<xml_diff>
--- a/output/figures/NMDS.end.pptx
+++ b/output/figures/NMDS.end.pptx
@@ -2332,7 +2332,7 @@
           </p:nvSpPr>
           <p:spPr>
             <a:xfrm>
-              <a:off x="1403392" y="2617935"/>
+              <a:off x="1403392" y="2617841"/>
               <a:ext cx="5659338" cy="0"/>
             </a:xfrm>
             <a:custGeom>
@@ -2375,7 +2375,7 @@
           </p:nvSpPr>
           <p:spPr>
             <a:xfrm>
-              <a:off x="4046093" y="983989"/>
+              <a:off x="4046210" y="983989"/>
               <a:ext cx="0" cy="3096637"/>
             </a:xfrm>
             <a:custGeom>
@@ -2418,7 +2418,357 @@
           </p:nvSpPr>
           <p:spPr>
             <a:xfrm>
-              <a:off x="3879724" y="2657905"/>
+              <a:off x="3879857" y="2657845"/>
+              <a:ext cx="49651" cy="49651"/>
+            </a:xfrm>
+            <a:prstGeom prst="ellipse">
+              <a:avLst/>
+            </a:prstGeom>
+            <a:solidFill>
+              <a:srgbClr val="E76BF3">
+                <a:alpha val="100000"/>
+              </a:srgbClr>
+            </a:solidFill>
+            <a:ln w="9000" cap="rnd">
+              <a:solidFill>
+                <a:srgbClr val="E76BF3">
+                  <a:alpha val="100000"/>
+                </a:srgbClr>
+              </a:solidFill>
+              <a:prstDash val="solid"/>
+              <a:round/>
+            </a:ln>
+          </p:spPr>
+          <p:txBody>
+            <a:bodyPr/>
+            <a:lstStyle/>
+            <a:p/>
+          </p:txBody>
+        </p:sp>
+        <p:sp>
+          <p:nvSpPr>
+            <p:cNvPr id="9" name="pt9"/>
+            <p:cNvSpPr/>
+            <p:nvPr/>
+          </p:nvSpPr>
+          <p:spPr>
+            <a:xfrm>
+              <a:off x="4688543" y="3543579"/>
+              <a:ext cx="49651" cy="49651"/>
+            </a:xfrm>
+            <a:prstGeom prst="ellipse">
+              <a:avLst/>
+            </a:prstGeom>
+            <a:solidFill>
+              <a:srgbClr val="E76BF3">
+                <a:alpha val="100000"/>
+              </a:srgbClr>
+            </a:solidFill>
+            <a:ln w="9000" cap="rnd">
+              <a:solidFill>
+                <a:srgbClr val="E76BF3">
+                  <a:alpha val="100000"/>
+                </a:srgbClr>
+              </a:solidFill>
+              <a:prstDash val="solid"/>
+              <a:round/>
+            </a:ln>
+          </p:spPr>
+          <p:txBody>
+            <a:bodyPr/>
+            <a:lstStyle/>
+            <a:p/>
+          </p:txBody>
+        </p:sp>
+        <p:sp>
+          <p:nvSpPr>
+            <p:cNvPr id="10" name="pt10"/>
+            <p:cNvSpPr/>
+            <p:nvPr/>
+          </p:nvSpPr>
+          <p:spPr>
+            <a:xfrm>
+              <a:off x="3235481" y="3440980"/>
+              <a:ext cx="49651" cy="49651"/>
+            </a:xfrm>
+            <a:prstGeom prst="ellipse">
+              <a:avLst/>
+            </a:prstGeom>
+            <a:solidFill>
+              <a:srgbClr val="E76BF3">
+                <a:alpha val="100000"/>
+              </a:srgbClr>
+            </a:solidFill>
+            <a:ln w="9000" cap="rnd">
+              <a:solidFill>
+                <a:srgbClr val="E76BF3">
+                  <a:alpha val="100000"/>
+                </a:srgbClr>
+              </a:solidFill>
+              <a:prstDash val="solid"/>
+              <a:round/>
+            </a:ln>
+          </p:spPr>
+          <p:txBody>
+            <a:bodyPr/>
+            <a:lstStyle/>
+            <a:p/>
+          </p:txBody>
+        </p:sp>
+        <p:sp>
+          <p:nvSpPr>
+            <p:cNvPr id="11" name="pt11"/>
+            <p:cNvSpPr/>
+            <p:nvPr/>
+          </p:nvSpPr>
+          <p:spPr>
+            <a:xfrm>
+              <a:off x="5095339" y="2938288"/>
+              <a:ext cx="49651" cy="49651"/>
+            </a:xfrm>
+            <a:prstGeom prst="ellipse">
+              <a:avLst/>
+            </a:prstGeom>
+            <a:solidFill>
+              <a:srgbClr val="E76BF3">
+                <a:alpha val="100000"/>
+              </a:srgbClr>
+            </a:solidFill>
+            <a:ln w="9000" cap="rnd">
+              <a:solidFill>
+                <a:srgbClr val="E76BF3">
+                  <a:alpha val="100000"/>
+                </a:srgbClr>
+              </a:solidFill>
+              <a:prstDash val="solid"/>
+              <a:round/>
+            </a:ln>
+          </p:spPr>
+          <p:txBody>
+            <a:bodyPr/>
+            <a:lstStyle/>
+            <a:p/>
+          </p:txBody>
+        </p:sp>
+        <p:sp>
+          <p:nvSpPr>
+            <p:cNvPr id="12" name="pt12"/>
+            <p:cNvSpPr/>
+            <p:nvPr/>
+          </p:nvSpPr>
+          <p:spPr>
+            <a:xfrm>
+              <a:off x="3618614" y="1862907"/>
+              <a:ext cx="49651" cy="49651"/>
+            </a:xfrm>
+            <a:prstGeom prst="ellipse">
+              <a:avLst/>
+            </a:prstGeom>
+            <a:solidFill>
+              <a:srgbClr val="E76BF3">
+                <a:alpha val="100000"/>
+              </a:srgbClr>
+            </a:solidFill>
+            <a:ln w="9000" cap="rnd">
+              <a:solidFill>
+                <a:srgbClr val="E76BF3">
+                  <a:alpha val="100000"/>
+                </a:srgbClr>
+              </a:solidFill>
+              <a:prstDash val="solid"/>
+              <a:round/>
+            </a:ln>
+          </p:spPr>
+          <p:txBody>
+            <a:bodyPr/>
+            <a:lstStyle/>
+            <a:p/>
+          </p:txBody>
+        </p:sp>
+        <p:sp>
+          <p:nvSpPr>
+            <p:cNvPr id="13" name="pt13"/>
+            <p:cNvSpPr/>
+            <p:nvPr/>
+          </p:nvSpPr>
+          <p:spPr>
+            <a:xfrm>
+              <a:off x="1781621" y="3069789"/>
+              <a:ext cx="49651" cy="49651"/>
+            </a:xfrm>
+            <a:prstGeom prst="ellipse">
+              <a:avLst/>
+            </a:prstGeom>
+            <a:solidFill>
+              <a:srgbClr val="00B0F6">
+                <a:alpha val="100000"/>
+              </a:srgbClr>
+            </a:solidFill>
+            <a:ln w="9000" cap="rnd">
+              <a:solidFill>
+                <a:srgbClr val="00B0F6">
+                  <a:alpha val="100000"/>
+                </a:srgbClr>
+              </a:solidFill>
+              <a:prstDash val="solid"/>
+              <a:round/>
+            </a:ln>
+          </p:spPr>
+          <p:txBody>
+            <a:bodyPr/>
+            <a:lstStyle/>
+            <a:p/>
+          </p:txBody>
+        </p:sp>
+        <p:sp>
+          <p:nvSpPr>
+            <p:cNvPr id="14" name="pt14"/>
+            <p:cNvSpPr/>
+            <p:nvPr/>
+          </p:nvSpPr>
+          <p:spPr>
+            <a:xfrm>
+              <a:off x="4478353" y="3915044"/>
+              <a:ext cx="49651" cy="49651"/>
+            </a:xfrm>
+            <a:prstGeom prst="ellipse">
+              <a:avLst/>
+            </a:prstGeom>
+            <a:solidFill>
+              <a:srgbClr val="00B0F6">
+                <a:alpha val="100000"/>
+              </a:srgbClr>
+            </a:solidFill>
+            <a:ln w="9000" cap="rnd">
+              <a:solidFill>
+                <a:srgbClr val="00B0F6">
+                  <a:alpha val="100000"/>
+                </a:srgbClr>
+              </a:solidFill>
+              <a:prstDash val="solid"/>
+              <a:round/>
+            </a:ln>
+          </p:spPr>
+          <p:txBody>
+            <a:bodyPr/>
+            <a:lstStyle/>
+            <a:p/>
+          </p:txBody>
+        </p:sp>
+        <p:sp>
+          <p:nvSpPr>
+            <p:cNvPr id="15" name="pt15"/>
+            <p:cNvSpPr/>
+            <p:nvPr/>
+          </p:nvSpPr>
+          <p:spPr>
+            <a:xfrm>
+              <a:off x="3028249" y="2451392"/>
+              <a:ext cx="49651" cy="49651"/>
+            </a:xfrm>
+            <a:prstGeom prst="ellipse">
+              <a:avLst/>
+            </a:prstGeom>
+            <a:solidFill>
+              <a:srgbClr val="00B0F6">
+                <a:alpha val="100000"/>
+              </a:srgbClr>
+            </a:solidFill>
+            <a:ln w="9000" cap="rnd">
+              <a:solidFill>
+                <a:srgbClr val="00B0F6">
+                  <a:alpha val="100000"/>
+                </a:srgbClr>
+              </a:solidFill>
+              <a:prstDash val="solid"/>
+              <a:round/>
+            </a:ln>
+          </p:spPr>
+          <p:txBody>
+            <a:bodyPr/>
+            <a:lstStyle/>
+            <a:p/>
+          </p:txBody>
+        </p:sp>
+        <p:sp>
+          <p:nvSpPr>
+            <p:cNvPr id="16" name="pt16"/>
+            <p:cNvSpPr/>
+            <p:nvPr/>
+          </p:nvSpPr>
+          <p:spPr>
+            <a:xfrm>
+              <a:off x="1781620" y="3069790"/>
+              <a:ext cx="49651" cy="49651"/>
+            </a:xfrm>
+            <a:prstGeom prst="ellipse">
+              <a:avLst/>
+            </a:prstGeom>
+            <a:solidFill>
+              <a:srgbClr val="00B0F6">
+                <a:alpha val="100000"/>
+              </a:srgbClr>
+            </a:solidFill>
+            <a:ln w="9000" cap="rnd">
+              <a:solidFill>
+                <a:srgbClr val="00B0F6">
+                  <a:alpha val="100000"/>
+                </a:srgbClr>
+              </a:solidFill>
+              <a:prstDash val="solid"/>
+              <a:round/>
+            </a:ln>
+          </p:spPr>
+          <p:txBody>
+            <a:bodyPr/>
+            <a:lstStyle/>
+            <a:p/>
+          </p:txBody>
+        </p:sp>
+        <p:sp>
+          <p:nvSpPr>
+            <p:cNvPr id="17" name="pt17"/>
+            <p:cNvSpPr/>
+            <p:nvPr/>
+          </p:nvSpPr>
+          <p:spPr>
+            <a:xfrm>
+              <a:off x="3643436" y="1458762"/>
+              <a:ext cx="49651" cy="49651"/>
+            </a:xfrm>
+            <a:prstGeom prst="ellipse">
+              <a:avLst/>
+            </a:prstGeom>
+            <a:solidFill>
+              <a:srgbClr val="00B0F6">
+                <a:alpha val="100000"/>
+              </a:srgbClr>
+            </a:solidFill>
+            <a:ln w="9000" cap="rnd">
+              <a:solidFill>
+                <a:srgbClr val="00B0F6">
+                  <a:alpha val="100000"/>
+                </a:srgbClr>
+              </a:solidFill>
+              <a:prstDash val="solid"/>
+              <a:round/>
+            </a:ln>
+          </p:spPr>
+          <p:txBody>
+            <a:bodyPr/>
+            <a:lstStyle/>
+            <a:p/>
+          </p:txBody>
+        </p:sp>
+        <p:sp>
+          <p:nvSpPr>
+            <p:cNvPr id="18" name="pt18"/>
+            <p:cNvSpPr/>
+            <p:nvPr/>
+          </p:nvSpPr>
+          <p:spPr>
+            <a:xfrm>
+              <a:off x="2933262" y="3401498"/>
               <a:ext cx="49651" cy="49651"/>
             </a:xfrm>
             <a:prstGeom prst="ellipse">
@@ -2447,13 +2797,13 @@
         </p:sp>
         <p:sp>
           <p:nvSpPr>
-            <p:cNvPr id="9" name="pt9"/>
-            <p:cNvSpPr/>
-            <p:nvPr/>
-          </p:nvSpPr>
-          <p:spPr>
-            <a:xfrm>
-              <a:off x="4688266" y="3543640"/>
+            <p:cNvPr id="19" name="pt19"/>
+            <p:cNvSpPr/>
+            <p:nvPr/>
+          </p:nvSpPr>
+          <p:spPr>
+            <a:xfrm>
+              <a:off x="1635808" y="2167919"/>
               <a:ext cx="49651" cy="49651"/>
             </a:xfrm>
             <a:prstGeom prst="ellipse">
@@ -2482,13 +2832,13 @@
         </p:sp>
         <p:sp>
           <p:nvSpPr>
-            <p:cNvPr id="10" name="pt10"/>
-            <p:cNvSpPr/>
-            <p:nvPr/>
-          </p:nvSpPr>
-          <p:spPr>
-            <a:xfrm>
-              <a:off x="3235395" y="3441004"/>
+            <p:cNvPr id="20" name="pt20"/>
+            <p:cNvSpPr/>
+            <p:nvPr/>
+          </p:nvSpPr>
+          <p:spPr>
+            <a:xfrm>
+              <a:off x="2941680" y="1099919"/>
               <a:ext cx="49651" cy="49651"/>
             </a:xfrm>
             <a:prstGeom prst="ellipse">
@@ -2517,13 +2867,13 @@
         </p:sp>
         <p:sp>
           <p:nvSpPr>
-            <p:cNvPr id="11" name="pt11"/>
-            <p:cNvSpPr/>
-            <p:nvPr/>
-          </p:nvSpPr>
-          <p:spPr>
-            <a:xfrm>
-              <a:off x="5095161" y="2938390"/>
+            <p:cNvPr id="21" name="pt21"/>
+            <p:cNvSpPr/>
+            <p:nvPr/>
+          </p:nvSpPr>
+          <p:spPr>
+            <a:xfrm>
+              <a:off x="3938284" y="2332951"/>
               <a:ext cx="49651" cy="49651"/>
             </a:xfrm>
             <a:prstGeom prst="ellipse">
@@ -2552,13 +2902,13 @@
         </p:sp>
         <p:sp>
           <p:nvSpPr>
-            <p:cNvPr id="12" name="pt12"/>
-            <p:cNvSpPr/>
-            <p:nvPr/>
-          </p:nvSpPr>
-          <p:spPr>
-            <a:xfrm>
-              <a:off x="3618639" y="1862914"/>
+            <p:cNvPr id="22" name="pt22"/>
+            <p:cNvSpPr/>
+            <p:nvPr/>
+          </p:nvSpPr>
+          <p:spPr>
+            <a:xfrm>
+              <a:off x="1781621" y="3069789"/>
               <a:ext cx="49651" cy="49651"/>
             </a:xfrm>
             <a:prstGeom prst="ellipse">
@@ -2587,13 +2937,13 @@
         </p:sp>
         <p:sp>
           <p:nvSpPr>
-            <p:cNvPr id="13" name="pt13"/>
-            <p:cNvSpPr/>
-            <p:nvPr/>
-          </p:nvSpPr>
-          <p:spPr>
-            <a:xfrm>
-              <a:off x="1781692" y="3069929"/>
+            <p:cNvPr id="23" name="pt23"/>
+            <p:cNvSpPr/>
+            <p:nvPr/>
+          </p:nvSpPr>
+          <p:spPr>
+            <a:xfrm>
+              <a:off x="6487826" y="2801700"/>
               <a:ext cx="49651" cy="49651"/>
             </a:xfrm>
             <a:prstGeom prst="ellipse">
@@ -2622,13 +2972,13 @@
         </p:sp>
         <p:sp>
           <p:nvSpPr>
-            <p:cNvPr id="14" name="pt14"/>
-            <p:cNvSpPr/>
-            <p:nvPr/>
-          </p:nvSpPr>
-          <p:spPr>
-            <a:xfrm>
-              <a:off x="4478037" y="3915044"/>
+            <p:cNvPr id="24" name="pt24"/>
+            <p:cNvSpPr/>
+            <p:nvPr/>
+          </p:nvSpPr>
+          <p:spPr>
+            <a:xfrm>
+              <a:off x="3364458" y="2074918"/>
               <a:ext cx="49651" cy="49651"/>
             </a:xfrm>
             <a:prstGeom prst="ellipse">
@@ -2657,13 +3007,13 @@
         </p:sp>
         <p:sp>
           <p:nvSpPr>
-            <p:cNvPr id="15" name="pt15"/>
-            <p:cNvSpPr/>
-            <p:nvPr/>
-          </p:nvSpPr>
-          <p:spPr>
-            <a:xfrm>
-              <a:off x="3028206" y="2451472"/>
+            <p:cNvPr id="25" name="pt25"/>
+            <p:cNvSpPr/>
+            <p:nvPr/>
+          </p:nvSpPr>
+          <p:spPr>
+            <a:xfrm>
+              <a:off x="3028249" y="2451392"/>
               <a:ext cx="49651" cy="49651"/>
             </a:xfrm>
             <a:prstGeom prst="ellipse">
@@ -2692,13 +3042,13 @@
         </p:sp>
         <p:sp>
           <p:nvSpPr>
-            <p:cNvPr id="16" name="pt16"/>
-            <p:cNvSpPr/>
-            <p:nvPr/>
-          </p:nvSpPr>
-          <p:spPr>
-            <a:xfrm>
-              <a:off x="1781692" y="3069929"/>
+            <p:cNvPr id="26" name="pt26"/>
+            <p:cNvSpPr/>
+            <p:nvPr/>
+          </p:nvSpPr>
+          <p:spPr>
+            <a:xfrm>
+              <a:off x="5610083" y="3060011"/>
               <a:ext cx="49651" cy="49651"/>
             </a:xfrm>
             <a:prstGeom prst="ellipse">
@@ -2727,13 +3077,13 @@
         </p:sp>
         <p:sp>
           <p:nvSpPr>
-            <p:cNvPr id="17" name="pt17"/>
-            <p:cNvSpPr/>
-            <p:nvPr/>
-          </p:nvSpPr>
-          <p:spPr>
-            <a:xfrm>
-              <a:off x="3643311" y="1458872"/>
+            <p:cNvPr id="27" name="pt27"/>
+            <p:cNvSpPr/>
+            <p:nvPr/>
+          </p:nvSpPr>
+          <p:spPr>
+            <a:xfrm>
+              <a:off x="3214123" y="1994757"/>
               <a:ext cx="49651" cy="49651"/>
             </a:xfrm>
             <a:prstGeom prst="ellipse">
@@ -2762,13 +3112,13 @@
         </p:sp>
         <p:sp>
           <p:nvSpPr>
-            <p:cNvPr id="18" name="pt18"/>
-            <p:cNvSpPr/>
-            <p:nvPr/>
-          </p:nvSpPr>
-          <p:spPr>
-            <a:xfrm>
-              <a:off x="2933164" y="3401647"/>
+            <p:cNvPr id="28" name="pt28"/>
+            <p:cNvSpPr/>
+            <p:nvPr/>
+          </p:nvSpPr>
+          <p:spPr>
+            <a:xfrm>
+              <a:off x="6078377" y="2231615"/>
               <a:ext cx="49651" cy="49651"/>
             </a:xfrm>
             <a:prstGeom prst="ellipse">
@@ -2797,13 +3147,13 @@
         </p:sp>
         <p:sp>
           <p:nvSpPr>
-            <p:cNvPr id="19" name="pt19"/>
-            <p:cNvSpPr/>
-            <p:nvPr/>
-          </p:nvSpPr>
-          <p:spPr>
-            <a:xfrm>
-              <a:off x="1635808" y="2168064"/>
+            <p:cNvPr id="29" name="pt29"/>
+            <p:cNvSpPr/>
+            <p:nvPr/>
+          </p:nvSpPr>
+          <p:spPr>
+            <a:xfrm>
+              <a:off x="6543554" y="1835399"/>
               <a:ext cx="49651" cy="49651"/>
             </a:xfrm>
             <a:prstGeom prst="ellipse">
@@ -2832,13 +3182,13 @@
         </p:sp>
         <p:sp>
           <p:nvSpPr>
-            <p:cNvPr id="20" name="pt20"/>
-            <p:cNvSpPr/>
-            <p:nvPr/>
-          </p:nvSpPr>
-          <p:spPr>
-            <a:xfrm>
-              <a:off x="2941590" y="1099919"/>
+            <p:cNvPr id="30" name="pt30"/>
+            <p:cNvSpPr/>
+            <p:nvPr/>
+          </p:nvSpPr>
+          <p:spPr>
+            <a:xfrm>
+              <a:off x="5666028" y="2643452"/>
               <a:ext cx="49651" cy="49651"/>
             </a:xfrm>
             <a:prstGeom prst="ellipse">
@@ -2867,13 +3217,13 @@
         </p:sp>
         <p:sp>
           <p:nvSpPr>
-            <p:cNvPr id="21" name="pt21"/>
-            <p:cNvSpPr/>
-            <p:nvPr/>
-          </p:nvSpPr>
-          <p:spPr>
-            <a:xfrm>
-              <a:off x="3938254" y="2332864"/>
+            <p:cNvPr id="31" name="pt31"/>
+            <p:cNvSpPr/>
+            <p:nvPr/>
+          </p:nvSpPr>
+          <p:spPr>
+            <a:xfrm>
+              <a:off x="6780662" y="2529142"/>
               <a:ext cx="49651" cy="49651"/>
             </a:xfrm>
             <a:prstGeom prst="ellipse">
@@ -2902,13 +3252,13 @@
         </p:sp>
         <p:sp>
           <p:nvSpPr>
-            <p:cNvPr id="22" name="pt22"/>
-            <p:cNvSpPr/>
-            <p:nvPr/>
-          </p:nvSpPr>
-          <p:spPr>
-            <a:xfrm>
-              <a:off x="1781692" y="3069929"/>
+            <p:cNvPr id="32" name="pt32"/>
+            <p:cNvSpPr/>
+            <p:nvPr/>
+          </p:nvSpPr>
+          <p:spPr>
+            <a:xfrm>
+              <a:off x="5299461" y="2722529"/>
               <a:ext cx="49651" cy="49651"/>
             </a:xfrm>
             <a:prstGeom prst="ellipse">
@@ -2937,380 +3287,33 @@
         </p:sp>
         <p:sp>
           <p:nvSpPr>
-            <p:cNvPr id="23" name="pt23"/>
-            <p:cNvSpPr/>
-            <p:nvPr/>
-          </p:nvSpPr>
-          <p:spPr>
-            <a:xfrm>
-              <a:off x="6487372" y="2801715"/>
-              <a:ext cx="49651" cy="49651"/>
-            </a:xfrm>
-            <a:prstGeom prst="ellipse">
-              <a:avLst/>
-            </a:prstGeom>
-            <a:solidFill>
-              <a:srgbClr val="00B0F6">
-                <a:alpha val="100000"/>
-              </a:srgbClr>
-            </a:solidFill>
-            <a:ln w="9000" cap="rnd">
-              <a:solidFill>
-                <a:srgbClr val="00B0F6">
-                  <a:alpha val="100000"/>
-                </a:srgbClr>
-              </a:solidFill>
-              <a:prstDash val="solid"/>
-              <a:round/>
-            </a:ln>
-          </p:spPr>
-          <p:txBody>
-            <a:bodyPr/>
-            <a:lstStyle/>
-            <a:p/>
-          </p:txBody>
-        </p:sp>
-        <p:sp>
-          <p:nvSpPr>
-            <p:cNvPr id="24" name="pt24"/>
-            <p:cNvSpPr/>
-            <p:nvPr/>
-          </p:nvSpPr>
-          <p:spPr>
-            <a:xfrm>
-              <a:off x="3364553" y="2074818"/>
-              <a:ext cx="49651" cy="49651"/>
-            </a:xfrm>
-            <a:prstGeom prst="ellipse">
-              <a:avLst/>
-            </a:prstGeom>
-            <a:solidFill>
-              <a:srgbClr val="00B0F6">
-                <a:alpha val="100000"/>
-              </a:srgbClr>
-            </a:solidFill>
-            <a:ln w="9000" cap="rnd">
-              <a:solidFill>
-                <a:srgbClr val="00B0F6">
-                  <a:alpha val="100000"/>
-                </a:srgbClr>
-              </a:solidFill>
-              <a:prstDash val="solid"/>
-              <a:round/>
-            </a:ln>
-          </p:spPr>
-          <p:txBody>
-            <a:bodyPr/>
-            <a:lstStyle/>
-            <a:p/>
-          </p:txBody>
-        </p:sp>
-        <p:sp>
-          <p:nvSpPr>
-            <p:cNvPr id="25" name="pt25"/>
-            <p:cNvSpPr/>
-            <p:nvPr/>
-          </p:nvSpPr>
-          <p:spPr>
-            <a:xfrm>
-              <a:off x="3028206" y="2451472"/>
-              <a:ext cx="49651" cy="49651"/>
-            </a:xfrm>
-            <a:prstGeom prst="ellipse">
-              <a:avLst/>
-            </a:prstGeom>
-            <a:solidFill>
-              <a:srgbClr val="00B0F6">
-                <a:alpha val="100000"/>
-              </a:srgbClr>
-            </a:solidFill>
-            <a:ln w="9000" cap="rnd">
-              <a:solidFill>
-                <a:srgbClr val="00B0F6">
-                  <a:alpha val="100000"/>
-                </a:srgbClr>
-              </a:solidFill>
-              <a:prstDash val="solid"/>
-              <a:round/>
-            </a:ln>
-          </p:spPr>
-          <p:txBody>
-            <a:bodyPr/>
-            <a:lstStyle/>
-            <a:p/>
-          </p:txBody>
-        </p:sp>
-        <p:sp>
-          <p:nvSpPr>
-            <p:cNvPr id="26" name="pt26"/>
-            <p:cNvSpPr/>
-            <p:nvPr/>
-          </p:nvSpPr>
-          <p:spPr>
-            <a:xfrm>
-              <a:off x="5609776" y="3060141"/>
-              <a:ext cx="49651" cy="49651"/>
-            </a:xfrm>
-            <a:prstGeom prst="ellipse">
-              <a:avLst/>
-            </a:prstGeom>
-            <a:solidFill>
-              <a:srgbClr val="00B0F6">
-                <a:alpha val="100000"/>
-              </a:srgbClr>
-            </a:solidFill>
-            <a:ln w="9000" cap="rnd">
-              <a:solidFill>
-                <a:srgbClr val="00B0F6">
-                  <a:alpha val="100000"/>
-                </a:srgbClr>
-              </a:solidFill>
-              <a:prstDash val="solid"/>
-              <a:round/>
-            </a:ln>
-          </p:spPr>
-          <p:txBody>
-            <a:bodyPr/>
-            <a:lstStyle/>
-            <a:p/>
-          </p:txBody>
-        </p:sp>
-        <p:sp>
-          <p:nvSpPr>
-            <p:cNvPr id="27" name="pt27"/>
-            <p:cNvSpPr/>
-            <p:nvPr/>
-          </p:nvSpPr>
-          <p:spPr>
-            <a:xfrm>
-              <a:off x="3213955" y="1994972"/>
-              <a:ext cx="49651" cy="49651"/>
-            </a:xfrm>
-            <a:prstGeom prst="ellipse">
-              <a:avLst/>
-            </a:prstGeom>
-            <a:solidFill>
-              <a:srgbClr val="00B0F6">
-                <a:alpha val="100000"/>
-              </a:srgbClr>
-            </a:solidFill>
-            <a:ln w="9000" cap="rnd">
-              <a:solidFill>
-                <a:srgbClr val="00B0F6">
-                  <a:alpha val="100000"/>
-                </a:srgbClr>
-              </a:solidFill>
-              <a:prstDash val="solid"/>
-              <a:round/>
-            </a:ln>
-          </p:spPr>
-          <p:txBody>
-            <a:bodyPr/>
-            <a:lstStyle/>
-            <a:p/>
-          </p:txBody>
-        </p:sp>
-        <p:sp>
-          <p:nvSpPr>
-            <p:cNvPr id="28" name="pt28"/>
-            <p:cNvSpPr/>
-            <p:nvPr/>
-          </p:nvSpPr>
-          <p:spPr>
-            <a:xfrm>
-              <a:off x="6078016" y="2231699"/>
-              <a:ext cx="49651" cy="49651"/>
-            </a:xfrm>
-            <a:prstGeom prst="ellipse">
-              <a:avLst/>
-            </a:prstGeom>
-            <a:solidFill>
-              <a:srgbClr val="E76BF3">
-                <a:alpha val="100000"/>
-              </a:srgbClr>
-            </a:solidFill>
-            <a:ln w="9000" cap="rnd">
-              <a:solidFill>
-                <a:srgbClr val="E76BF3">
-                  <a:alpha val="100000"/>
-                </a:srgbClr>
-              </a:solidFill>
-              <a:prstDash val="solid"/>
-              <a:round/>
-            </a:ln>
-          </p:spPr>
-          <p:txBody>
-            <a:bodyPr/>
-            <a:lstStyle/>
-            <a:p/>
-          </p:txBody>
-        </p:sp>
-        <p:sp>
-          <p:nvSpPr>
-            <p:cNvPr id="29" name="pt29"/>
-            <p:cNvSpPr/>
-            <p:nvPr/>
-          </p:nvSpPr>
-          <p:spPr>
-            <a:xfrm>
-              <a:off x="6543333" y="1835531"/>
-              <a:ext cx="49651" cy="49651"/>
-            </a:xfrm>
-            <a:prstGeom prst="ellipse">
-              <a:avLst/>
-            </a:prstGeom>
-            <a:solidFill>
-              <a:srgbClr val="E76BF3">
-                <a:alpha val="100000"/>
-              </a:srgbClr>
-            </a:solidFill>
-            <a:ln w="9000" cap="rnd">
-              <a:solidFill>
-                <a:srgbClr val="E76BF3">
-                  <a:alpha val="100000"/>
-                </a:srgbClr>
-              </a:solidFill>
-              <a:prstDash val="solid"/>
-              <a:round/>
-            </a:ln>
-          </p:spPr>
-          <p:txBody>
-            <a:bodyPr/>
-            <a:lstStyle/>
-            <a:p/>
-          </p:txBody>
-        </p:sp>
-        <p:sp>
-          <p:nvSpPr>
-            <p:cNvPr id="30" name="pt30"/>
-            <p:cNvSpPr/>
-            <p:nvPr/>
-          </p:nvSpPr>
-          <p:spPr>
-            <a:xfrm>
-              <a:off x="5665907" y="2643796"/>
-              <a:ext cx="49651" cy="49651"/>
-            </a:xfrm>
-            <a:prstGeom prst="ellipse">
-              <a:avLst/>
-            </a:prstGeom>
-            <a:solidFill>
-              <a:srgbClr val="E76BF3">
-                <a:alpha val="100000"/>
-              </a:srgbClr>
-            </a:solidFill>
-            <a:ln w="9000" cap="rnd">
-              <a:solidFill>
-                <a:srgbClr val="E76BF3">
-                  <a:alpha val="100000"/>
-                </a:srgbClr>
-              </a:solidFill>
-              <a:prstDash val="solid"/>
-              <a:round/>
-            </a:ln>
-          </p:spPr>
-          <p:txBody>
-            <a:bodyPr/>
-            <a:lstStyle/>
-            <a:p/>
-          </p:txBody>
-        </p:sp>
-        <p:sp>
-          <p:nvSpPr>
-            <p:cNvPr id="31" name="pt31"/>
-            <p:cNvSpPr/>
-            <p:nvPr/>
-          </p:nvSpPr>
-          <p:spPr>
-            <a:xfrm>
-              <a:off x="6780662" y="2529321"/>
-              <a:ext cx="49651" cy="49651"/>
-            </a:xfrm>
-            <a:prstGeom prst="ellipse">
-              <a:avLst/>
-            </a:prstGeom>
-            <a:solidFill>
-              <a:srgbClr val="E76BF3">
-                <a:alpha val="100000"/>
-              </a:srgbClr>
-            </a:solidFill>
-            <a:ln w="9000" cap="rnd">
-              <a:solidFill>
-                <a:srgbClr val="E76BF3">
-                  <a:alpha val="100000"/>
-                </a:srgbClr>
-              </a:solidFill>
-              <a:prstDash val="solid"/>
-              <a:round/>
-            </a:ln>
-          </p:spPr>
-          <p:txBody>
-            <a:bodyPr/>
-            <a:lstStyle/>
-            <a:p/>
-          </p:txBody>
-        </p:sp>
-        <p:sp>
-          <p:nvSpPr>
-            <p:cNvPr id="32" name="pt32"/>
-            <p:cNvSpPr/>
-            <p:nvPr/>
-          </p:nvSpPr>
-          <p:spPr>
-            <a:xfrm>
-              <a:off x="5299269" y="2722733"/>
-              <a:ext cx="49651" cy="49651"/>
-            </a:xfrm>
-            <a:prstGeom prst="ellipse">
-              <a:avLst/>
-            </a:prstGeom>
-            <a:solidFill>
-              <a:srgbClr val="E76BF3">
-                <a:alpha val="100000"/>
-              </a:srgbClr>
-            </a:solidFill>
-            <a:ln w="9000" cap="rnd">
-              <a:solidFill>
-                <a:srgbClr val="E76BF3">
-                  <a:alpha val="100000"/>
-                </a:srgbClr>
-              </a:solidFill>
-              <a:prstDash val="solid"/>
-              <a:round/>
-            </a:ln>
-          </p:spPr>
-          <p:txBody>
-            <a:bodyPr/>
-            <a:lstStyle/>
-            <a:p/>
-          </p:txBody>
-        </p:sp>
-        <p:sp>
-          <p:nvSpPr>
             <p:cNvPr id="33" name="pg33"/>
             <p:cNvSpPr/>
             <p:nvPr/>
           </p:nvSpPr>
           <p:spPr>
             <a:xfrm>
-              <a:off x="3260221" y="1887740"/>
-              <a:ext cx="1859766" cy="1680725"/>
+              <a:off x="1660634" y="1124745"/>
+              <a:ext cx="2302475" cy="2301579"/>
             </a:xfrm>
             <a:custGeom>
               <a:avLst/>
               <a:pathLst>
-                <a:path w="1859766" h="1680725">
+                <a:path w="2302475" h="2301579">
                   <a:moveTo>
-                    <a:pt x="1452870" y="1680725"/>
+                    <a:pt x="1297453" y="2301579"/>
                   </a:moveTo>
                   <a:lnTo>
-                    <a:pt x="0" y="1578089"/>
+                    <a:pt x="145812" y="1969870"/>
                   </a:lnTo>
                   <a:lnTo>
-                    <a:pt x="383243" y="0"/>
+                    <a:pt x="0" y="1068000"/>
                   </a:lnTo>
                   <a:lnTo>
-                    <a:pt x="1859766" y="1075476"/>
+                    <a:pt x="1305871" y="0"/>
+                  </a:lnTo>
+                  <a:lnTo>
+                    <a:pt x="2302475" y="1233032"/>
                   </a:lnTo>
                   <a:close/>
                 </a:path>
@@ -3336,21 +3339,24 @@
           </p:nvSpPr>
           <p:spPr>
             <a:xfrm>
-              <a:off x="1806518" y="1483698"/>
-              <a:ext cx="2696345" cy="2456172"/>
+              <a:off x="3053075" y="2019583"/>
+              <a:ext cx="3459576" cy="1065254"/>
             </a:xfrm>
             <a:custGeom>
               <a:avLst/>
               <a:pathLst>
-                <a:path w="2696345" h="2456172">
+                <a:path w="3459576" h="1065254">
                   <a:moveTo>
-                    <a:pt x="2696345" y="2456172"/>
+                    <a:pt x="3459576" y="806943"/>
                   </a:moveTo>
                   <a:lnTo>
-                    <a:pt x="0" y="1611057"/>
+                    <a:pt x="2581833" y="1065254"/>
                   </a:lnTo>
                   <a:lnTo>
-                    <a:pt x="1861619" y="0"/>
+                    <a:pt x="0" y="456635"/>
+                  </a:lnTo>
+                  <a:lnTo>
+                    <a:pt x="185873" y="0"/>
                   </a:lnTo>
                   <a:close/>
                 </a:path>
@@ -3376,27 +3382,21 @@
           </p:nvSpPr>
           <p:spPr>
             <a:xfrm>
-              <a:off x="1660634" y="1124745"/>
-              <a:ext cx="2302445" cy="2301728"/>
+              <a:off x="5324287" y="1860224"/>
+              <a:ext cx="1481201" cy="887129"/>
             </a:xfrm>
             <a:custGeom>
               <a:avLst/>
               <a:pathLst>
-                <a:path w="2302445" h="2301728">
+                <a:path w="1481201" h="887129">
                   <a:moveTo>
-                    <a:pt x="1297355" y="2301728"/>
+                    <a:pt x="1481201" y="693743"/>
                   </a:moveTo>
                   <a:lnTo>
-                    <a:pt x="145883" y="1970010"/>
+                    <a:pt x="0" y="887129"/>
                   </a:lnTo>
                   <a:lnTo>
-                    <a:pt x="0" y="1068144"/>
-                  </a:lnTo>
-                  <a:lnTo>
-                    <a:pt x="1305781" y="0"/>
-                  </a:lnTo>
-                  <a:lnTo>
-                    <a:pt x="2302445" y="1232945"/>
+                    <a:pt x="1244093" y="0"/>
                   </a:lnTo>
                   <a:close/>
                 </a:path>
@@ -3422,24 +3422,21 @@
           </p:nvSpPr>
           <p:spPr>
             <a:xfrm>
-              <a:off x="3053032" y="2019798"/>
-              <a:ext cx="3459166" cy="1065169"/>
+              <a:off x="1806446" y="1483588"/>
+              <a:ext cx="2696732" cy="2456282"/>
             </a:xfrm>
             <a:custGeom>
               <a:avLst/>
               <a:pathLst>
-                <a:path w="3459166" h="1065169">
+                <a:path w="2696732" h="2456282">
                   <a:moveTo>
-                    <a:pt x="3459166" y="806742"/>
+                    <a:pt x="2696732" y="2456282"/>
                   </a:moveTo>
                   <a:lnTo>
-                    <a:pt x="2581569" y="1065169"/>
+                    <a:pt x="0" y="1611027"/>
                   </a:lnTo>
                   <a:lnTo>
-                    <a:pt x="0" y="456500"/>
-                  </a:lnTo>
-                  <a:lnTo>
-                    <a:pt x="185749" y="0"/>
+                    <a:pt x="1861815" y="0"/>
                   </a:lnTo>
                   <a:close/>
                 </a:path>
@@ -3465,21 +3462,24 @@
           </p:nvSpPr>
           <p:spPr>
             <a:xfrm>
-              <a:off x="5324095" y="1860356"/>
-              <a:ext cx="1481392" cy="887202"/>
+              <a:off x="3260307" y="1887733"/>
+              <a:ext cx="1859857" cy="1680671"/>
             </a:xfrm>
             <a:custGeom>
               <a:avLst/>
               <a:pathLst>
-                <a:path w="1481392" h="887202">
+                <a:path w="1859857" h="1680671">
                   <a:moveTo>
-                    <a:pt x="1481392" y="693790"/>
+                    <a:pt x="1453061" y="1680671"/>
                   </a:moveTo>
                   <a:lnTo>
-                    <a:pt x="0" y="887202"/>
+                    <a:pt x="0" y="1578073"/>
                   </a:lnTo>
                   <a:lnTo>
-                    <a:pt x="1244064" y="0"/>
+                    <a:pt x="383132" y="0"/>
+                  </a:lnTo>
+                  <a:lnTo>
+                    <a:pt x="1859857" y="1075380"/>
                   </a:lnTo>
                   <a:close/>
                 </a:path>
@@ -3505,18 +3505,18 @@
           </p:nvSpPr>
           <p:spPr>
             <a:xfrm>
-              <a:off x="4046093" y="2617935"/>
-              <a:ext cx="1840957" cy="930015"/>
+              <a:off x="4046210" y="2617841"/>
+              <a:ext cx="1841034" cy="930116"/>
             </a:xfrm>
             <a:custGeom>
               <a:avLst/>
               <a:pathLst>
-                <a:path w="1840957" h="930015">
+                <a:path w="1841034" h="930116">
                   <a:moveTo>
                     <a:pt x="0" y="0"/>
                   </a:moveTo>
                   <a:lnTo>
-                    <a:pt x="1840957" y="930015"/>
+                    <a:pt x="1841034" y="930116"/>
                   </a:lnTo>
                 </a:path>
               </a:pathLst>
@@ -3545,7 +3545,7 @@
           </p:nvSpPr>
           <p:spPr>
             <a:xfrm>
-              <a:off x="5832272" y="3502041"/>
+              <a:off x="5832466" y="3502047"/>
               <a:ext cx="54778" cy="48969"/>
             </a:xfrm>
             <a:custGeom>
@@ -3556,10 +3556,10 @@
                     <a:pt x="0" y="48969"/>
                   </a:moveTo>
                   <a:lnTo>
-                    <a:pt x="54778" y="45909"/>
+                    <a:pt x="54778" y="45910"/>
                   </a:lnTo>
                   <a:lnTo>
-                    <a:pt x="24738" y="0"/>
+                    <a:pt x="24739" y="0"/>
                   </a:lnTo>
                 </a:path>
               </a:pathLst>
@@ -3588,18 +3588,18 @@
           </p:nvSpPr>
           <p:spPr>
             <a:xfrm>
-              <a:off x="4046093" y="1579782"/>
-              <a:ext cx="1132092" cy="1038152"/>
+              <a:off x="4046210" y="1579650"/>
+              <a:ext cx="1132227" cy="1038190"/>
             </a:xfrm>
             <a:custGeom>
               <a:avLst/>
               <a:pathLst>
-                <a:path w="1132092" h="1038152">
+                <a:path w="1132227" h="1038190">
                   <a:moveTo>
-                    <a:pt x="0" y="1038152"/>
+                    <a:pt x="0" y="1038190"/>
                   </a:moveTo>
                   <a:lnTo>
-                    <a:pt x="1132092" y="0"/>
+                    <a:pt x="1132227" y="0"/>
                   </a:lnTo>
                 </a:path>
               </a:pathLst>
@@ -3628,7 +3628,7 @@
           </p:nvSpPr>
           <p:spPr>
             <a:xfrm>
-              <a:off x="5124626" y="1579782"/>
+              <a:off x="5124878" y="1579650"/>
               <a:ext cx="53559" cy="52330"/>
             </a:xfrm>
             <a:custGeom>
@@ -3636,13 +3636,13 @@
               <a:pathLst>
                 <a:path w="53559" h="52330">
                   <a:moveTo>
-                    <a:pt x="37080" y="52330"/>
+                    <a:pt x="37079" y="52330"/>
                   </a:moveTo>
                   <a:lnTo>
                     <a:pt x="53559" y="0"/>
                   </a:lnTo>
                   <a:lnTo>
-                    <a:pt x="0" y="11894"/>
+                    <a:pt x="0" y="11892"/>
                   </a:lnTo>
                 </a:path>
               </a:pathLst>
@@ -3671,18 +3671,18 @@
           </p:nvSpPr>
           <p:spPr>
             <a:xfrm>
-              <a:off x="4046093" y="2617935"/>
-              <a:ext cx="1415001" cy="866269"/>
+              <a:off x="4046210" y="2617841"/>
+              <a:ext cx="1415033" cy="866456"/>
             </a:xfrm>
             <a:custGeom>
               <a:avLst/>
               <a:pathLst>
-                <a:path w="1415001" h="866269">
+                <a:path w="1415033" h="866456">
                   <a:moveTo>
                     <a:pt x="0" y="0"/>
                   </a:moveTo>
                   <a:lnTo>
-                    <a:pt x="1415001" y="866269"/>
+                    <a:pt x="1415033" y="866456"/>
                   </a:lnTo>
                 </a:path>
               </a:pathLst>
@@ -3711,21 +3711,21 @@
           </p:nvSpPr>
           <p:spPr>
             <a:xfrm>
-              <a:off x="5406249" y="3436000"/>
-              <a:ext cx="54845" cy="48204"/>
+              <a:off x="5406397" y="3436090"/>
+              <a:ext cx="54845" cy="48206"/>
             </a:xfrm>
             <a:custGeom>
               <a:avLst/>
               <a:pathLst>
-                <a:path w="54845" h="48204">
+                <a:path w="54845" h="48206">
                   <a:moveTo>
-                    <a:pt x="0" y="46791"/>
+                    <a:pt x="0" y="46789"/>
                   </a:moveTo>
                   <a:lnTo>
-                    <a:pt x="54845" y="48204"/>
+                    <a:pt x="54845" y="48206"/>
                   </a:lnTo>
                   <a:lnTo>
-                    <a:pt x="28646" y="0"/>
+                    <a:pt x="28650" y="0"/>
                   </a:lnTo>
                 </a:path>
               </a:pathLst>
@@ -3754,18 +3754,18 @@
           </p:nvSpPr>
           <p:spPr>
             <a:xfrm>
-              <a:off x="4046093" y="2617935"/>
-              <a:ext cx="624281" cy="744236"/>
+              <a:off x="4046210" y="2617841"/>
+              <a:ext cx="624321" cy="744087"/>
             </a:xfrm>
             <a:custGeom>
               <a:avLst/>
               <a:pathLst>
-                <a:path w="624281" h="744236">
+                <a:path w="624321" h="744087">
                   <a:moveTo>
                     <a:pt x="0" y="0"/>
                   </a:moveTo>
                   <a:lnTo>
-                    <a:pt x="624281" y="744236"/>
+                    <a:pt x="624321" y="744087"/>
                   </a:lnTo>
                 </a:path>
               </a:pathLst>
@@ -3794,21 +3794,21 @@
           </p:nvSpPr>
           <p:spPr>
             <a:xfrm>
-              <a:off x="4618822" y="3308140"/>
-              <a:ext cx="51552" cy="54032"/>
+              <a:off x="4618976" y="3307897"/>
+              <a:ext cx="51554" cy="54030"/>
             </a:xfrm>
             <a:custGeom>
               <a:avLst/>
               <a:pathLst>
-                <a:path w="51552" h="54032">
+                <a:path w="51554" h="54030">
                   <a:moveTo>
-                    <a:pt x="0" y="35259"/>
+                    <a:pt x="0" y="35264"/>
                   </a:moveTo>
                   <a:lnTo>
-                    <a:pt x="51552" y="54032"/>
+                    <a:pt x="51554" y="54030"/>
                   </a:lnTo>
                   <a:lnTo>
-                    <a:pt x="42034" y="0"/>
+                    <a:pt x="42029" y="0"/>
                   </a:lnTo>
                 </a:path>
               </a:pathLst>
@@ -3837,15 +3837,15 @@
           </p:nvSpPr>
           <p:spPr>
             <a:xfrm>
-              <a:off x="3850537" y="1507898"/>
-              <a:ext cx="195555" cy="1110036"/>
+              <a:off x="3850622" y="1507784"/>
+              <a:ext cx="195587" cy="1110056"/>
             </a:xfrm>
             <a:custGeom>
               <a:avLst/>
               <a:pathLst>
-                <a:path w="195555" h="1110036">
+                <a:path w="195587" h="1110056">
                   <a:moveTo>
-                    <a:pt x="195555" y="1110036"/>
+                    <a:pt x="195587" y="1110056"/>
                   </a:moveTo>
                   <a:lnTo>
                     <a:pt x="0" y="0"/>
@@ -3877,7 +3877,7 @@
           </p:nvSpPr>
           <p:spPr>
             <a:xfrm>
-              <a:off x="3831765" y="1507898"/>
+              <a:off x="3831851" y="1507784"/>
               <a:ext cx="54031" cy="51552"/>
             </a:xfrm>
             <a:custGeom>
@@ -3885,10 +3885,10 @@
               <a:pathLst>
                 <a:path w="54031" h="51552">
                   <a:moveTo>
-                    <a:pt x="54031" y="42033"/>
+                    <a:pt x="54031" y="42032"/>
                   </a:moveTo>
                   <a:lnTo>
-                    <a:pt x="18772" y="0"/>
+                    <a:pt x="18771" y="0"/>
                   </a:lnTo>
                   <a:lnTo>
                     <a:pt x="0" y="51552"/>
@@ -3920,18 +3920,18 @@
           </p:nvSpPr>
           <p:spPr>
             <a:xfrm>
-              <a:off x="4046093" y="1697954"/>
-              <a:ext cx="1106097" cy="919980"/>
+              <a:off x="4046210" y="1697844"/>
+              <a:ext cx="1106200" cy="919997"/>
             </a:xfrm>
             <a:custGeom>
               <a:avLst/>
               <a:pathLst>
-                <a:path w="1106097" h="919980">
+                <a:path w="1106200" h="919997">
                   <a:moveTo>
-                    <a:pt x="0" y="919980"/>
+                    <a:pt x="0" y="919997"/>
                   </a:moveTo>
                   <a:lnTo>
-                    <a:pt x="1106097" y="0"/>
+                    <a:pt x="1106200" y="0"/>
                   </a:lnTo>
                 </a:path>
               </a:pathLst>
@@ -3960,21 +3960,21 @@
           </p:nvSpPr>
           <p:spPr>
             <a:xfrm>
-              <a:off x="5098119" y="1697954"/>
-              <a:ext cx="54071" cy="51473"/>
+              <a:off x="5098339" y="1697844"/>
+              <a:ext cx="54071" cy="51472"/>
             </a:xfrm>
             <a:custGeom>
               <a:avLst/>
               <a:pathLst>
-                <a:path w="54071" h="51473">
+                <a:path w="54071" h="51472">
                   <a:moveTo>
-                    <a:pt x="35083" y="51473"/>
+                    <a:pt x="35081" y="51472"/>
                   </a:moveTo>
                   <a:lnTo>
                     <a:pt x="54071" y="0"/>
                   </a:lnTo>
                   <a:lnTo>
-                    <a:pt x="0" y="9292"/>
+                    <a:pt x="0" y="9290"/>
                   </a:lnTo>
                 </a:path>
               </a:pathLst>
@@ -4003,18 +4003,18 @@
           </p:nvSpPr>
           <p:spPr>
             <a:xfrm>
-              <a:off x="4046093" y="2148791"/>
-              <a:ext cx="1723089" cy="469143"/>
+              <a:off x="4046210" y="2148902"/>
+              <a:ext cx="1723355" cy="468938"/>
             </a:xfrm>
             <a:custGeom>
               <a:avLst/>
               <a:pathLst>
-                <a:path w="1723089" h="469143">
+                <a:path w="1723355" h="468938">
                   <a:moveTo>
-                    <a:pt x="0" y="469143"/>
+                    <a:pt x="0" y="468938"/>
                   </a:moveTo>
                   <a:lnTo>
-                    <a:pt x="1723089" y="0"/>
+                    <a:pt x="1723355" y="0"/>
                   </a:lnTo>
                 </a:path>
               </a:pathLst>
@@ -4043,18 +4043,18 @@
           </p:nvSpPr>
           <p:spPr>
             <a:xfrm>
-              <a:off x="5716131" y="2134805"/>
-              <a:ext cx="53051" cy="52936"/>
+              <a:off x="5716516" y="2134908"/>
+              <a:ext cx="53049" cy="52939"/>
             </a:xfrm>
             <a:custGeom>
               <a:avLst/>
               <a:pathLst>
-                <a:path w="53051" h="52936">
+                <a:path w="53049" h="52939">
                   <a:moveTo>
-                    <a:pt x="14413" y="52936"/>
+                    <a:pt x="14405" y="52939"/>
                   </a:moveTo>
                   <a:lnTo>
-                    <a:pt x="53051" y="13986"/>
+                    <a:pt x="53049" y="13994"/>
                   </a:lnTo>
                   <a:lnTo>
                     <a:pt x="0" y="0"/>
@@ -4086,18 +4086,18 @@
           </p:nvSpPr>
           <p:spPr>
             <a:xfrm>
-              <a:off x="4046093" y="2617935"/>
-              <a:ext cx="1213606" cy="306099"/>
+              <a:off x="4046210" y="2617841"/>
+              <a:ext cx="1213685" cy="306474"/>
             </a:xfrm>
             <a:custGeom>
               <a:avLst/>
               <a:pathLst>
-                <a:path w="1213606" h="306099">
+                <a:path w="1213685" h="306474">
                   <a:moveTo>
                     <a:pt x="0" y="0"/>
                   </a:moveTo>
                   <a:lnTo>
-                    <a:pt x="1213606" y="306099"/>
+                    <a:pt x="1213685" y="306474"/>
                   </a:lnTo>
                 </a:path>
               </a:pathLst>
@@ -4126,21 +4126,21 @@
           </p:nvSpPr>
           <p:spPr>
             <a:xfrm>
-              <a:off x="5206920" y="2885815"/>
-              <a:ext cx="52779" cy="53197"/>
+              <a:off x="5207111" y="2886086"/>
+              <a:ext cx="52783" cy="53194"/>
             </a:xfrm>
             <a:custGeom>
               <a:avLst/>
               <a:pathLst>
-                <a:path w="52779" h="53197">
+                <a:path w="52783" h="53194">
                   <a:moveTo>
-                    <a:pt x="0" y="53197"/>
+                    <a:pt x="0" y="53194"/>
                   </a:moveTo>
                   <a:lnTo>
-                    <a:pt x="52779" y="38219"/>
+                    <a:pt x="52783" y="38229"/>
                   </a:lnTo>
                   <a:lnTo>
-                    <a:pt x="13417" y="0"/>
+                    <a:pt x="13432" y="0"/>
                   </a:lnTo>
                 </a:path>
               </a:pathLst>
@@ -4169,7 +4169,7 @@
           </p:nvSpPr>
           <p:spPr>
             <a:xfrm>
-              <a:off x="5872410" y="3562909"/>
+              <a:off x="5872612" y="3562925"/>
               <a:ext cx="397472" cy="128223"/>
             </a:xfrm>
             <a:prstGeom prst="rect">
@@ -4215,7 +4215,7 @@
           </p:nvSpPr>
           <p:spPr>
             <a:xfrm>
-              <a:off x="5069382" y="1424144"/>
+              <a:off x="5069648" y="1424007"/>
               <a:ext cx="444024" cy="102003"/>
             </a:xfrm>
             <a:prstGeom prst="rect">
@@ -4261,7 +4261,7 @@
           </p:nvSpPr>
           <p:spPr>
             <a:xfrm>
-              <a:off x="5388250" y="3489433"/>
+              <a:off x="5388401" y="3489545"/>
               <a:ext cx="428689" cy="131577"/>
             </a:xfrm>
             <a:prstGeom prst="rect">
@@ -4307,7 +4307,7 @@
           </p:nvSpPr>
           <p:spPr>
             <a:xfrm>
-              <a:off x="4518492" y="3384772"/>
+              <a:off x="4518652" y="3384513"/>
               <a:ext cx="428621" cy="102003"/>
             </a:xfrm>
             <a:prstGeom prst="rect">
@@ -4353,7 +4353,7 @@
           </p:nvSpPr>
           <p:spPr>
             <a:xfrm>
-              <a:off x="3620539" y="1345071"/>
+              <a:off x="3620621" y="1344955"/>
               <a:ext cx="420885" cy="102003"/>
             </a:xfrm>
             <a:prstGeom prst="rect">
@@ -4399,7 +4399,7 @@
           </p:nvSpPr>
           <p:spPr>
             <a:xfrm>
-              <a:off x="5060230" y="1552353"/>
+              <a:off x="5219981" y="1640246"/>
               <a:ext cx="405139" cy="103783"/>
             </a:xfrm>
             <a:prstGeom prst="rect">
@@ -4445,7 +4445,7 @@
           </p:nvSpPr>
           <p:spPr>
             <a:xfrm>
-              <a:off x="5742755" y="2048273"/>
+              <a:off x="5743164" y="2048405"/>
               <a:ext cx="397472" cy="103783"/>
             </a:xfrm>
             <a:prstGeom prst="rect">
@@ -4491,7 +4491,7 @@
           </p:nvSpPr>
           <p:spPr>
             <a:xfrm>
-              <a:off x="5306324" y="2873246"/>
+              <a:off x="5306550" y="2873565"/>
               <a:ext cx="428621" cy="131577"/>
             </a:xfrm>
             <a:prstGeom prst="rect">
@@ -4577,7 +4577,7 @@
           </p:nvSpPr>
           <p:spPr>
             <a:xfrm>
-              <a:off x="1148183" y="3315427"/>
+              <a:off x="1148183" y="3315342"/>
               <a:ext cx="192578" cy="81691"/>
             </a:xfrm>
             <a:prstGeom prst="rect">
@@ -4623,7 +4623,7 @@
           </p:nvSpPr>
           <p:spPr>
             <a:xfrm>
-              <a:off x="1185400" y="2576243"/>
+              <a:off x="1185400" y="2576149"/>
               <a:ext cx="155361" cy="81691"/>
             </a:xfrm>
             <a:prstGeom prst="rect">
@@ -4669,7 +4669,7 @@
           </p:nvSpPr>
           <p:spPr>
             <a:xfrm>
-              <a:off x="1185400" y="1837059"/>
+              <a:off x="1185400" y="1836956"/>
               <a:ext cx="155361" cy="81691"/>
             </a:xfrm>
             <a:prstGeom prst="rect">
@@ -4715,7 +4715,7 @@
           </p:nvSpPr>
           <p:spPr>
             <a:xfrm>
-              <a:off x="1185400" y="1097876"/>
+              <a:off x="1185400" y="1097763"/>
               <a:ext cx="155361" cy="81691"/>
             </a:xfrm>
             <a:prstGeom prst="rect">
@@ -4761,7 +4761,7 @@
           </p:nvSpPr>
           <p:spPr>
             <a:xfrm>
-              <a:off x="1368597" y="3357118"/>
+              <a:off x="1368597" y="3357033"/>
               <a:ext cx="34794" cy="0"/>
             </a:xfrm>
             <a:custGeom>
@@ -4801,7 +4801,7 @@
           </p:nvSpPr>
           <p:spPr>
             <a:xfrm>
-              <a:off x="1368597" y="2617935"/>
+              <a:off x="1368597" y="2617841"/>
               <a:ext cx="34794" cy="0"/>
             </a:xfrm>
             <a:custGeom>
@@ -4841,7 +4841,7 @@
           </p:nvSpPr>
           <p:spPr>
             <a:xfrm>
-              <a:off x="1368597" y="1878751"/>
+              <a:off x="1368597" y="1878648"/>
               <a:ext cx="34794" cy="0"/>
             </a:xfrm>
             <a:custGeom>
@@ -4881,7 +4881,7 @@
           </p:nvSpPr>
           <p:spPr>
             <a:xfrm>
-              <a:off x="1368597" y="1139568"/>
+              <a:off x="1368597" y="1139455"/>
               <a:ext cx="34794" cy="0"/>
             </a:xfrm>
             <a:custGeom>
@@ -4961,7 +4961,7 @@
           </p:nvSpPr>
           <p:spPr>
             <a:xfrm>
-              <a:off x="1588524" y="4080626"/>
+              <a:off x="1588458" y="4080626"/>
               <a:ext cx="0" cy="34794"/>
             </a:xfrm>
             <a:custGeom>
@@ -5001,7 +5001,7 @@
           </p:nvSpPr>
           <p:spPr>
             <a:xfrm>
-              <a:off x="2817309" y="4080626"/>
+              <a:off x="2817334" y="4080626"/>
               <a:ext cx="0" cy="34794"/>
             </a:xfrm>
             <a:custGeom>
@@ -5041,7 +5041,7 @@
           </p:nvSpPr>
           <p:spPr>
             <a:xfrm>
-              <a:off x="4046093" y="4080626"/>
+              <a:off x="4046210" y="4080626"/>
               <a:ext cx="0" cy="34794"/>
             </a:xfrm>
             <a:custGeom>
@@ -5081,7 +5081,7 @@
           </p:nvSpPr>
           <p:spPr>
             <a:xfrm>
-              <a:off x="5274878" y="4080626"/>
+              <a:off x="5275086" y="4080626"/>
               <a:ext cx="0" cy="34794"/>
             </a:xfrm>
             <a:custGeom>
@@ -5121,7 +5121,7 @@
           </p:nvSpPr>
           <p:spPr>
             <a:xfrm>
-              <a:off x="6503662" y="4080626"/>
+              <a:off x="6503962" y="4080626"/>
               <a:ext cx="0" cy="34794"/>
             </a:xfrm>
             <a:custGeom>
@@ -5161,7 +5161,7 @@
           </p:nvSpPr>
           <p:spPr>
             <a:xfrm>
-              <a:off x="1492235" y="4141565"/>
+              <a:off x="1492168" y="4141565"/>
               <a:ext cx="192578" cy="81691"/>
             </a:xfrm>
             <a:prstGeom prst="rect">
@@ -5207,7 +5207,7 @@
           </p:nvSpPr>
           <p:spPr>
             <a:xfrm>
-              <a:off x="2721019" y="4141565"/>
+              <a:off x="2721044" y="4141565"/>
               <a:ext cx="192578" cy="81691"/>
             </a:xfrm>
             <a:prstGeom prst="rect">
@@ -5253,7 +5253,7 @@
           </p:nvSpPr>
           <p:spPr>
             <a:xfrm>
-              <a:off x="3968412" y="4141565"/>
+              <a:off x="3968529" y="4141565"/>
               <a:ext cx="155361" cy="81691"/>
             </a:xfrm>
             <a:prstGeom prst="rect">
@@ -5299,7 +5299,7 @@
           </p:nvSpPr>
           <p:spPr>
             <a:xfrm>
-              <a:off x="5197197" y="4141565"/>
+              <a:off x="5197405" y="4141565"/>
               <a:ext cx="155361" cy="81691"/>
             </a:xfrm>
             <a:prstGeom prst="rect">
@@ -5345,7 +5345,7 @@
           </p:nvSpPr>
           <p:spPr>
             <a:xfrm>
-              <a:off x="6425982" y="4141565"/>
+              <a:off x="6426281" y="4141565"/>
               <a:ext cx="155361" cy="81691"/>
             </a:xfrm>
             <a:prstGeom prst="rect">
@@ -5860,8 +5860,8 @@
           </p:nvSpPr>
           <p:spPr>
             <a:xfrm>
-              <a:off x="6639037" y="3304793"/>
-              <a:ext cx="155252" cy="80000"/>
+              <a:off x="6639037" y="3303047"/>
+              <a:ext cx="298117" cy="81746"/>
             </a:xfrm>
             <a:prstGeom prst="rect">
               <a:avLst/>
@@ -5893,7 +5893,7 @@
                   <a:latin typeface="Arial"/>
                   <a:cs typeface="Arial"/>
                 </a:rPr>
-                <a:t>BH</a:t>
+                <a:t>D3BH</a:t>
               </a:r>
             </a:p>
           </p:txBody>
@@ -5906,8 +5906,8 @@
           </p:nvSpPr>
           <p:spPr>
             <a:xfrm>
-              <a:off x="6639037" y="3405153"/>
-              <a:ext cx="161473" cy="87639"/>
+              <a:off x="6639037" y="3411429"/>
+              <a:ext cx="298117" cy="81364"/>
             </a:xfrm>
             <a:prstGeom prst="rect">
               <a:avLst/>
@@ -5939,7 +5939,7 @@
                   <a:latin typeface="Arial"/>
                   <a:cs typeface="Arial"/>
                 </a:rPr>
-                <a:t>BQ</a:t>
+                <a:t>D5BH</a:t>
               </a:r>
             </a:p>
           </p:txBody>
@@ -5952,8 +5952,8 @@
           </p:nvSpPr>
           <p:spPr>
             <a:xfrm>
-              <a:off x="6639037" y="3520793"/>
-              <a:ext cx="142865" cy="80000"/>
+              <a:off x="6639037" y="3519101"/>
+              <a:ext cx="298117" cy="81691"/>
             </a:xfrm>
             <a:prstGeom prst="rect">
               <a:avLst/>
@@ -5985,7 +5985,7 @@
                   <a:latin typeface="Arial"/>
                   <a:cs typeface="Arial"/>
                 </a:rPr>
-                <a:t>DL</a:t>
+                <a:t>D9BH</a:t>
               </a:r>
             </a:p>
           </p:txBody>
@@ -5998,8 +5998,8 @@
           </p:nvSpPr>
           <p:spPr>
             <a:xfrm>
-              <a:off x="6639037" y="3628793"/>
-              <a:ext cx="173806" cy="80000"/>
+              <a:off x="6639037" y="3627101"/>
+              <a:ext cx="279563" cy="81691"/>
             </a:xfrm>
             <a:prstGeom prst="rect">
               <a:avLst/>
@@ -6031,7 +6031,7 @@
                   <a:latin typeface="Arial"/>
                   <a:cs typeface="Arial"/>
                 </a:rPr>
-                <a:t>DM</a:t>
+                <a:t>D9BL</a:t>
               </a:r>
             </a:p>
           </p:txBody>
@@ -6044,8 +6044,8 @@
           </p:nvSpPr>
           <p:spPr>
             <a:xfrm>
-              <a:off x="6639037" y="3736793"/>
-              <a:ext cx="105484" cy="80000"/>
+              <a:off x="6639037" y="3735101"/>
+              <a:ext cx="310505" cy="81691"/>
             </a:xfrm>
             <a:prstGeom prst="rect">
               <a:avLst/>
@@ -6077,7 +6077,7 @@
                   <a:latin typeface="Arial"/>
                   <a:cs typeface="Arial"/>
                 </a:rPr>
-                <a:t>W</a:t>
+                <a:t>D9BM</a:t>
               </a:r>
             </a:p>
           </p:txBody>

</xml_diff>